<commit_message>
structure ppt planif done
</commit_message>
<xml_diff>
--- a/soutenances/planification/soutenance_planification.pptx
+++ b/soutenances/planification/soutenance_planification.pptx
@@ -5,7 +5,7 @@
     <p:sldMasterId id="2147483684" r:id="rId1"/>
   </p:sldMasterIdLst>
   <p:notesMasterIdLst>
-    <p:notesMasterId r:id="rId12"/>
+    <p:notesMasterId r:id="rId25"/>
   </p:notesMasterIdLst>
   <p:sldIdLst>
     <p:sldId id="256" r:id="rId2"/>
@@ -17,7 +17,20 @@
     <p:sldId id="264" r:id="rId8"/>
     <p:sldId id="261" r:id="rId9"/>
     <p:sldId id="266" r:id="rId10"/>
-    <p:sldId id="260" r:id="rId11"/>
+    <p:sldId id="267" r:id="rId11"/>
+    <p:sldId id="268" r:id="rId12"/>
+    <p:sldId id="269" r:id="rId13"/>
+    <p:sldId id="270" r:id="rId14"/>
+    <p:sldId id="271" r:id="rId15"/>
+    <p:sldId id="272" r:id="rId16"/>
+    <p:sldId id="273" r:id="rId17"/>
+    <p:sldId id="276" r:id="rId18"/>
+    <p:sldId id="275" r:id="rId19"/>
+    <p:sldId id="274" r:id="rId20"/>
+    <p:sldId id="277" r:id="rId21"/>
+    <p:sldId id="278" r:id="rId22"/>
+    <p:sldId id="279" r:id="rId23"/>
+    <p:sldId id="280" r:id="rId24"/>
   </p:sldIdLst>
   <p:sldSz cx="9144000" cy="6858000" type="screen4x3"/>
   <p:notesSz cx="6858000" cy="9144000"/>
@@ -201,6 +214,7 @@
           <a:p>
             <a:fld id="{870840C3-A359-44A7-AB98-329BE5E6CEFD}" type="datetimeFigureOut">
               <a:rPr lang="fr-FR" smtClean="0"/>
+              <a:pPr/>
               <a:t>16/12/2014</a:t>
             </a:fld>
             <a:endParaRPr lang="fr-FR"/>
@@ -362,6 +376,7 @@
           <a:p>
             <a:fld id="{40484E77-AB6C-4413-9E0F-BEF59DCF287A}" type="slidenum">
               <a:rPr lang="fr-FR" smtClean="0"/>
+              <a:pPr/>
               <a:t>‹N°›</a:t>
             </a:fld>
             <a:endParaRPr lang="fr-FR"/>
@@ -541,6 +556,7 @@
           <a:p>
             <a:fld id="{40484E77-AB6C-4413-9E0F-BEF59DCF287A}" type="slidenum">
               <a:rPr lang="fr-FR" smtClean="0"/>
+              <a:pPr/>
               <a:t>5</a:t>
             </a:fld>
             <a:endParaRPr lang="fr-FR"/>
@@ -630,6 +646,7 @@
           <a:p>
             <a:fld id="{40484E77-AB6C-4413-9E0F-BEF59DCF287A}" type="slidenum">
               <a:rPr lang="fr-FR" smtClean="0"/>
+              <a:pPr/>
               <a:t>6</a:t>
             </a:fld>
             <a:endParaRPr lang="fr-FR"/>
@@ -733,7 +750,7 @@
             <a:blip r:embed="rId2" cstate="print">
               <a:extLst>
                 <a:ext uri="{28A0092B-C50C-407E-A947-70E740481C1C}">
-                  <a14:useLocalDpi xmlns:a14="http://schemas.microsoft.com/office/drawing/2010/main" xmlns="" val="0"/>
+                  <a14:useLocalDpi xmlns="" xmlns:a14="http://schemas.microsoft.com/office/drawing/2010/main" val="0"/>
                 </a:ext>
               </a:extLst>
             </a:blip>
@@ -751,7 +768,7 @@
             <a:noFill/>
             <a:extLst>
               <a:ext uri="{909E8E84-426E-40DD-AFC4-6F175D3DCCD1}">
-                <a14:hiddenFill xmlns:a14="http://schemas.microsoft.com/office/drawing/2010/main" xmlns="">
+                <a14:hiddenFill xmlns="" xmlns:a14="http://schemas.microsoft.com/office/drawing/2010/main">
                   <a:solidFill>
                     <a:srgbClr val="FFFFFF"/>
                   </a:solidFill>
@@ -772,7 +789,7 @@
             <a:blip r:embed="rId3" cstate="print">
               <a:extLst>
                 <a:ext uri="{28A0092B-C50C-407E-A947-70E740481C1C}">
-                  <a14:useLocalDpi xmlns:a14="http://schemas.microsoft.com/office/drawing/2010/main" xmlns="" val="0"/>
+                  <a14:useLocalDpi xmlns="" xmlns:a14="http://schemas.microsoft.com/office/drawing/2010/main" val="0"/>
                 </a:ext>
               </a:extLst>
             </a:blip>
@@ -792,7 +809,7 @@
             <a:noFill/>
             <a:extLst>
               <a:ext uri="{909E8E84-426E-40DD-AFC4-6F175D3DCCD1}">
-                <a14:hiddenFill xmlns:a14="http://schemas.microsoft.com/office/drawing/2010/main" xmlns="">
+                <a14:hiddenFill xmlns="" xmlns:a14="http://schemas.microsoft.com/office/drawing/2010/main">
                   <a:solidFill>
                     <a:srgbClr val="FFFFFF"/>
                   </a:solidFill>
@@ -1841,7 +1858,7 @@
     </p:spTree>
     <p:extLst>
       <p:ext uri="{BB962C8B-B14F-4D97-AF65-F5344CB8AC3E}">
-        <p14:creationId xmlns:p14="http://schemas.microsoft.com/office/powerpoint/2010/main" xmlns="" val="2155599893"/>
+        <p14:creationId xmlns="" xmlns:p14="http://schemas.microsoft.com/office/powerpoint/2010/main" val="2155599893"/>
       </p:ext>
     </p:extLst>
   </p:cSld>
@@ -1998,7 +2015,7 @@
     </p:spTree>
     <p:extLst>
       <p:ext uri="{BB962C8B-B14F-4D97-AF65-F5344CB8AC3E}">
-        <p14:creationId xmlns:p14="http://schemas.microsoft.com/office/powerpoint/2010/main" xmlns="" val="2625538701"/>
+        <p14:creationId xmlns="" xmlns:p14="http://schemas.microsoft.com/office/powerpoint/2010/main" val="2625538701"/>
       </p:ext>
     </p:extLst>
   </p:cSld>
@@ -2225,7 +2242,7 @@
     </p:spTree>
     <p:extLst>
       <p:ext uri="{BB962C8B-B14F-4D97-AF65-F5344CB8AC3E}">
-        <p14:creationId xmlns:p14="http://schemas.microsoft.com/office/powerpoint/2010/main" xmlns="" val="1505370761"/>
+        <p14:creationId xmlns="" xmlns:p14="http://schemas.microsoft.com/office/powerpoint/2010/main" val="1505370761"/>
       </p:ext>
     </p:extLst>
   </p:cSld>
@@ -2470,7 +2487,7 @@
     </p:spTree>
     <p:extLst>
       <p:ext uri="{BB962C8B-B14F-4D97-AF65-F5344CB8AC3E}">
-        <p14:creationId xmlns:p14="http://schemas.microsoft.com/office/powerpoint/2010/main" xmlns="" val="1601618539"/>
+        <p14:creationId xmlns="" xmlns:p14="http://schemas.microsoft.com/office/powerpoint/2010/main" val="1601618539"/>
       </p:ext>
     </p:extLst>
   </p:cSld>
@@ -2853,7 +2870,7 @@
     </p:spTree>
     <p:extLst>
       <p:ext uri="{BB962C8B-B14F-4D97-AF65-F5344CB8AC3E}">
-        <p14:creationId xmlns:p14="http://schemas.microsoft.com/office/powerpoint/2010/main" xmlns="" val="171255179"/>
+        <p14:creationId xmlns="" xmlns:p14="http://schemas.microsoft.com/office/powerpoint/2010/main" val="171255179"/>
       </p:ext>
     </p:extLst>
   </p:cSld>
@@ -2954,7 +2971,7 @@
     </p:spTree>
     <p:extLst>
       <p:ext uri="{BB962C8B-B14F-4D97-AF65-F5344CB8AC3E}">
-        <p14:creationId xmlns:p14="http://schemas.microsoft.com/office/powerpoint/2010/main" xmlns="" val="4241946124"/>
+        <p14:creationId xmlns="" xmlns:p14="http://schemas.microsoft.com/office/powerpoint/2010/main" val="4241946124"/>
       </p:ext>
     </p:extLst>
   </p:cSld>
@@ -2991,7 +3008,7 @@
     </p:spTree>
     <p:extLst>
       <p:ext uri="{BB962C8B-B14F-4D97-AF65-F5344CB8AC3E}">
-        <p14:creationId xmlns:p14="http://schemas.microsoft.com/office/powerpoint/2010/main" xmlns="" val="3843733788"/>
+        <p14:creationId xmlns="" xmlns:p14="http://schemas.microsoft.com/office/powerpoint/2010/main" val="3843733788"/>
       </p:ext>
     </p:extLst>
   </p:cSld>
@@ -3286,7 +3303,7 @@
     </p:spTree>
     <p:extLst>
       <p:ext uri="{BB962C8B-B14F-4D97-AF65-F5344CB8AC3E}">
-        <p14:creationId xmlns:p14="http://schemas.microsoft.com/office/powerpoint/2010/main" xmlns="" val="680884878"/>
+        <p14:creationId xmlns="" xmlns:p14="http://schemas.microsoft.com/office/powerpoint/2010/main" val="680884878"/>
       </p:ext>
     </p:extLst>
   </p:cSld>
@@ -4529,7 +4546,7 @@
           <a:blip r:embed="rId11" cstate="print">
             <a:extLst>
               <a:ext uri="{28A0092B-C50C-407E-A947-70E740481C1C}">
-                <a14:useLocalDpi xmlns:a14="http://schemas.microsoft.com/office/drawing/2010/main" xmlns="" val="0"/>
+                <a14:useLocalDpi xmlns="" xmlns:a14="http://schemas.microsoft.com/office/drawing/2010/main" val="0"/>
               </a:ext>
             </a:extLst>
           </a:blip>
@@ -4547,7 +4564,7 @@
           <a:noFill/>
           <a:extLst>
             <a:ext uri="{909E8E84-426E-40DD-AFC4-6F175D3DCCD1}">
-              <a14:hiddenFill xmlns:a14="http://schemas.microsoft.com/office/drawing/2010/main" xmlns="">
+              <a14:hiddenFill xmlns="" xmlns:a14="http://schemas.microsoft.com/office/drawing/2010/main">
                 <a:solidFill>
                   <a:srgbClr val="FFFFFF"/>
                 </a:solidFill>
@@ -4568,7 +4585,7 @@
           <a:blip r:embed="rId12" cstate="print">
             <a:extLst>
               <a:ext uri="{28A0092B-C50C-407E-A947-70E740481C1C}">
-                <a14:useLocalDpi xmlns:a14="http://schemas.microsoft.com/office/drawing/2010/main" xmlns="" val="0"/>
+                <a14:useLocalDpi xmlns="" xmlns:a14="http://schemas.microsoft.com/office/drawing/2010/main" val="0"/>
               </a:ext>
             </a:extLst>
           </a:blip>
@@ -4588,7 +4605,7 @@
           <a:noFill/>
           <a:extLst>
             <a:ext uri="{909E8E84-426E-40DD-AFC4-6F175D3DCCD1}">
-              <a14:hiddenFill xmlns:a14="http://schemas.microsoft.com/office/drawing/2010/main" xmlns="">
+              <a14:hiddenFill xmlns="" xmlns:a14="http://schemas.microsoft.com/office/drawing/2010/main">
                 <a:solidFill>
                   <a:srgbClr val="FFFFFF"/>
                 </a:solidFill>
@@ -4746,7 +4763,7 @@
             <a:lum bright="70000" contrast="-70000"/>
             <a:extLst>
               <a:ext uri="{28A0092B-C50C-407E-A947-70E740481C1C}">
-                <a14:useLocalDpi xmlns:a14="http://schemas.microsoft.com/office/drawing/2010/main" xmlns="" val="0"/>
+                <a14:useLocalDpi xmlns="" xmlns:a14="http://schemas.microsoft.com/office/drawing/2010/main" val="0"/>
               </a:ext>
             </a:extLst>
           </a:blip>
@@ -4767,7 +4784,7 @@
     </p:spTree>
     <p:extLst>
       <p:ext uri="{BB962C8B-B14F-4D97-AF65-F5344CB8AC3E}">
-        <p14:creationId xmlns:p14="http://schemas.microsoft.com/office/powerpoint/2010/main" xmlns="" val="3080300347"/>
+        <p14:creationId xmlns="" xmlns:p14="http://schemas.microsoft.com/office/powerpoint/2010/main" val="3080300347"/>
       </p:ext>
     </p:extLst>
   </p:cSld>
@@ -5094,17 +5111,7 @@
                   </a:schemeClr>
                 </a:solidFill>
               </a:rPr>
-              <a:t>Soutenance de </a:t>
-            </a:r>
-            <a:r>
-              <a:rPr lang="fr-FR" cap="small" smtClean="0">
-                <a:solidFill>
-                  <a:schemeClr val="tx1">
-                    <a:lumMod val="50000"/>
-                  </a:schemeClr>
-                </a:solidFill>
-              </a:rPr>
-              <a:t>planification</a:t>
+              <a:t>Soutenance de planification</a:t>
             </a:r>
             <a:endParaRPr lang="fr-FR" cap="small">
               <a:solidFill>
@@ -5124,7 +5131,7 @@
         </p:nvSpPr>
         <p:spPr>
           <a:xfrm>
-            <a:off x="6372200" y="1988840"/>
+            <a:off x="6300192" y="332656"/>
             <a:ext cx="2448272" cy="369332"/>
           </a:xfrm>
           <a:prstGeom prst="rect">
@@ -5142,18 +5149,14 @@
             <a:r>
               <a:rPr lang="fr-FR" b="1" smtClean="0">
                 <a:solidFill>
-                  <a:schemeClr val="tx1">
-                    <a:lumMod val="50000"/>
-                  </a:schemeClr>
+                  <a:schemeClr val="accent5"/>
                 </a:solidFill>
               </a:rPr>
               <a:t>Encadrants</a:t>
             </a:r>
             <a:endParaRPr lang="fr-FR" b="1">
               <a:solidFill>
-                <a:schemeClr val="tx1">
-                  <a:lumMod val="50000"/>
-                </a:schemeClr>
+                <a:schemeClr val="accent5"/>
               </a:solidFill>
             </a:endParaRPr>
           </a:p>
@@ -5167,7 +5170,7 @@
         </p:nvSpPr>
         <p:spPr>
           <a:xfrm>
-            <a:off x="6300192" y="2420888"/>
+            <a:off x="6228184" y="764704"/>
             <a:ext cx="2520280" cy="646331"/>
           </a:xfrm>
           <a:prstGeom prst="rect">
@@ -5190,17 +5193,7 @@
                   </a:schemeClr>
                 </a:solidFill>
               </a:rPr>
-              <a:t>Gildas </a:t>
-            </a:r>
-            <a:r>
-              <a:rPr lang="fr-FR" smtClean="0">
-                <a:solidFill>
-                  <a:schemeClr val="tx1">
-                    <a:lumMod val="50000"/>
-                  </a:schemeClr>
-                </a:solidFill>
-              </a:rPr>
-              <a:t>AVOINE</a:t>
+              <a:t>Gildas AVOINE</a:t>
             </a:r>
           </a:p>
           <a:p>
@@ -5233,7 +5226,7 @@
         </p:nvSpPr>
         <p:spPr>
           <a:xfrm>
-            <a:off x="6516216" y="4077072"/>
+            <a:off x="6300192" y="4077072"/>
             <a:ext cx="2448272" cy="369332"/>
           </a:xfrm>
           <a:prstGeom prst="rect">
@@ -5251,18 +5244,14 @@
             <a:r>
               <a:rPr lang="fr-FR" b="1" smtClean="0">
                 <a:solidFill>
-                  <a:schemeClr val="tx1">
-                    <a:lumMod val="50000"/>
-                  </a:schemeClr>
+                  <a:schemeClr val="accent5"/>
                 </a:solidFill>
               </a:rPr>
               <a:t>Étudiants</a:t>
             </a:r>
             <a:endParaRPr lang="fr-FR" b="1">
               <a:solidFill>
-                <a:schemeClr val="tx1">
-                  <a:lumMod val="50000"/>
-                </a:schemeClr>
+                <a:schemeClr val="accent5"/>
               </a:solidFill>
             </a:endParaRPr>
           </a:p>
@@ -5276,7 +5265,7 @@
         </p:nvSpPr>
         <p:spPr>
           <a:xfrm>
-            <a:off x="6516216" y="4509120"/>
+            <a:off x="6300192" y="4509120"/>
             <a:ext cx="2448272" cy="1754326"/>
           </a:xfrm>
           <a:prstGeom prst="rect">
@@ -5384,8 +5373,8 @@
         </p:nvSpPr>
         <p:spPr>
           <a:xfrm>
-            <a:off x="251520" y="3140968"/>
-            <a:ext cx="3672408" cy="830997"/>
+            <a:off x="0" y="2060848"/>
+            <a:ext cx="4716016" cy="1620763"/>
           </a:xfrm>
           <a:prstGeom prst="rect">
             <a:avLst/>
@@ -5399,70 +5388,62 @@
           <a:lstStyle/>
           <a:p>
             <a:r>
-              <a:rPr lang="fr-FR" sz="2400" smtClean="0">
+              <a:rPr lang="fr-FR" sz="2500" cap="small" smtClean="0">
                 <a:solidFill>
                   <a:schemeClr val="tx1">
                     <a:lumMod val="50000"/>
                   </a:schemeClr>
                 </a:solidFill>
               </a:rPr>
-              <a:t>Logiciel d’analyse </a:t>
-            </a:r>
-          </a:p>
-          <a:p>
-            <a:r>
-              <a:rPr lang="fr-FR" sz="2400" smtClean="0">
+              <a:t>Est-il difficile </a:t>
+            </a:r>
+          </a:p>
+          <a:p>
+            <a:r>
+              <a:rPr lang="fr-FR" sz="2500" cap="small" smtClean="0">
                 <a:solidFill>
                   <a:schemeClr val="tx1">
                     <a:lumMod val="50000"/>
                   </a:schemeClr>
                 </a:solidFill>
               </a:rPr>
-              <a:t>de sécurité</a:t>
-            </a:r>
-            <a:endParaRPr lang="fr-FR" sz="2400">
-              <a:solidFill>
-                <a:schemeClr val="tx1">
-                  <a:lumMod val="50000"/>
-                </a:schemeClr>
-              </a:solidFill>
-            </a:endParaRPr>
-          </a:p>
-        </p:txBody>
-      </p:sp>
-      <p:sp>
-        <p:nvSpPr>
-          <p:cNvPr id="10" name="ZoneTexte 9"/>
-          <p:cNvSpPr txBox="1"/>
-          <p:nvPr/>
-        </p:nvSpPr>
-        <p:spPr>
-          <a:xfrm>
-            <a:off x="179512" y="2204864"/>
-            <a:ext cx="4104456" cy="923330"/>
-          </a:xfrm>
-          <a:prstGeom prst="rect">
-            <a:avLst/>
-          </a:prstGeom>
-          <a:noFill/>
-        </p:spPr>
-        <p:txBody>
-          <a:bodyPr wrap="square" rtlCol="0">
-            <a:spAutoFit/>
-          </a:bodyPr>
-          <a:lstStyle/>
-          <a:p>
-            <a:r>
-              <a:rPr lang="fr-FR" sz="5400" b="1" cap="small" smtClean="0">
+              <a:t>de paralyser les</a:t>
+            </a:r>
+          </a:p>
+          <a:p>
+            <a:r>
+              <a:rPr lang="fr-FR" sz="2500" cap="small" smtClean="0">
                 <a:solidFill>
                   <a:schemeClr val="tx1">
                     <a:lumMod val="50000"/>
                   </a:schemeClr>
                 </a:solidFill>
               </a:rPr>
-              <a:t>Glasir</a:t>
-            </a:r>
-            <a:endParaRPr lang="fr-FR" sz="5400" b="1" cap="small">
+              <a:t>transports en commun </a:t>
+            </a:r>
+          </a:p>
+          <a:p>
+            <a:r>
+              <a:rPr lang="fr-FR" sz="2500" cap="small" smtClean="0">
+                <a:solidFill>
+                  <a:schemeClr val="tx1">
+                    <a:lumMod val="50000"/>
+                  </a:schemeClr>
+                </a:solidFill>
+              </a:rPr>
+              <a:t>à </a:t>
+            </a:r>
+            <a:r>
+              <a:rPr lang="fr-FR" sz="2500" cap="small" smtClean="0">
+                <a:solidFill>
+                  <a:schemeClr val="tx1">
+                    <a:lumMod val="50000"/>
+                  </a:schemeClr>
+                </a:solidFill>
+              </a:rPr>
+              <a:t>Rennes ?</a:t>
+            </a:r>
+            <a:endParaRPr lang="fr-FR" sz="2500" cap="small">
               <a:solidFill>
                 <a:schemeClr val="tx1">
                   <a:lumMod val="50000"/>
@@ -5522,7 +5503,7 @@
             <a:pPr algn="ctr"/>
             <a:r>
               <a:rPr lang="fr-FR" smtClean="0"/>
-              <a:t>Planification</a:t>
+              <a:t>Contexte</a:t>
             </a:r>
             <a:endParaRPr lang="fr-FR"/>
           </a:p>
@@ -5543,7 +5524,915 @@
           <a:bodyPr/>
           <a:lstStyle/>
           <a:p>
+            <a:pPr algn="ctr"/>
+            <a:r>
+              <a:rPr lang="fr-FR" sz="2800" smtClean="0"/>
+              <a:t>Éléments d’entrée</a:t>
+            </a:r>
+            <a:endParaRPr lang="fr-FR" sz="2800" smtClean="0"/>
+          </a:p>
+          <a:p>
+            <a:pPr algn="ctr"/>
             <a:endParaRPr lang="fr-FR"/>
+          </a:p>
+          <a:p>
+            <a:r>
+              <a:rPr lang="fr-FR" smtClean="0"/>
+              <a:t>ADTool</a:t>
+            </a:r>
+            <a:endParaRPr lang="fr-FR"/>
+          </a:p>
+        </p:txBody>
+      </p:sp>
+    </p:spTree>
+  </p:cSld>
+  <p:clrMapOvr>
+    <a:masterClrMapping/>
+  </p:clrMapOvr>
+  <p:timing>
+    <p:tnLst>
+      <p:par>
+        <p:cTn id="1" dur="indefinite" restart="never" nodeType="tmRoot"/>
+      </p:par>
+    </p:tnLst>
+  </p:timing>
+</p:sld>
+</file>
+
+<file path=ppt/slides/slide11.xml><?xml version="1.0" encoding="utf-8"?>
+<p:sld xmlns:a="http://schemas.openxmlformats.org/drawingml/2006/main" xmlns:r="http://schemas.openxmlformats.org/officeDocument/2006/relationships" xmlns:p="http://schemas.openxmlformats.org/presentationml/2006/main">
+  <p:cSld>
+    <p:spTree>
+      <p:nvGrpSpPr>
+        <p:cNvPr id="1" name=""/>
+        <p:cNvGrpSpPr/>
+        <p:nvPr/>
+      </p:nvGrpSpPr>
+      <p:grpSpPr>
+        <a:xfrm>
+          <a:off x="0" y="0"/>
+          <a:ext cx="0" cy="0"/>
+          <a:chOff x="0" y="0"/>
+          <a:chExt cx="0" cy="0"/>
+        </a:xfrm>
+      </p:grpSpPr>
+      <p:sp>
+        <p:nvSpPr>
+          <p:cNvPr id="2" name="Titre 1"/>
+          <p:cNvSpPr>
+            <a:spLocks noGrp="1"/>
+          </p:cNvSpPr>
+          <p:nvPr>
+            <p:ph type="title"/>
+          </p:nvPr>
+        </p:nvSpPr>
+        <p:spPr/>
+        <p:txBody>
+          <a:bodyPr/>
+          <a:lstStyle/>
+          <a:p>
+            <a:pPr algn="ctr"/>
+            <a:r>
+              <a:rPr lang="fr-FR" smtClean="0"/>
+              <a:t>Contexte</a:t>
+            </a:r>
+            <a:endParaRPr lang="fr-FR"/>
+          </a:p>
+        </p:txBody>
+      </p:sp>
+      <p:sp>
+        <p:nvSpPr>
+          <p:cNvPr id="3" name="Espace réservé du contenu 2"/>
+          <p:cNvSpPr>
+            <a:spLocks noGrp="1"/>
+          </p:cNvSpPr>
+          <p:nvPr>
+            <p:ph idx="1"/>
+          </p:nvPr>
+        </p:nvSpPr>
+        <p:spPr/>
+        <p:txBody>
+          <a:bodyPr/>
+          <a:lstStyle/>
+          <a:p>
+            <a:pPr algn="ctr"/>
+            <a:r>
+              <a:rPr lang="fr-FR" sz="2800" smtClean="0"/>
+              <a:t>Périmètre de qualification</a:t>
+            </a:r>
+          </a:p>
+          <a:p>
+            <a:pPr algn="ctr"/>
+            <a:endParaRPr lang="fr-FR"/>
+          </a:p>
+          <a:p>
+            <a:r>
+              <a:rPr lang="fr-FR" smtClean="0"/>
+              <a:t>Windows</a:t>
+            </a:r>
+            <a:endParaRPr lang="fr-FR"/>
+          </a:p>
+        </p:txBody>
+      </p:sp>
+    </p:spTree>
+  </p:cSld>
+  <p:clrMapOvr>
+    <a:masterClrMapping/>
+  </p:clrMapOvr>
+  <p:timing>
+    <p:tnLst>
+      <p:par>
+        <p:cTn id="1" dur="indefinite" restart="never" nodeType="tmRoot"/>
+      </p:par>
+    </p:tnLst>
+  </p:timing>
+</p:sld>
+</file>
+
+<file path=ppt/slides/slide12.xml><?xml version="1.0" encoding="utf-8"?>
+<p:sld xmlns:a="http://schemas.openxmlformats.org/drawingml/2006/main" xmlns:r="http://schemas.openxmlformats.org/officeDocument/2006/relationships" xmlns:p="http://schemas.openxmlformats.org/presentationml/2006/main">
+  <p:cSld>
+    <p:spTree>
+      <p:nvGrpSpPr>
+        <p:cNvPr id="1" name=""/>
+        <p:cNvGrpSpPr/>
+        <p:nvPr/>
+      </p:nvGrpSpPr>
+      <p:grpSpPr>
+        <a:xfrm>
+          <a:off x="0" y="0"/>
+          <a:ext cx="0" cy="0"/>
+          <a:chOff x="0" y="0"/>
+          <a:chExt cx="0" cy="0"/>
+        </a:xfrm>
+      </p:grpSpPr>
+      <p:sp>
+        <p:nvSpPr>
+          <p:cNvPr id="2" name="Titre 1"/>
+          <p:cNvSpPr>
+            <a:spLocks noGrp="1"/>
+          </p:cNvSpPr>
+          <p:nvPr>
+            <p:ph type="title"/>
+          </p:nvPr>
+        </p:nvSpPr>
+        <p:spPr/>
+        <p:txBody>
+          <a:bodyPr/>
+          <a:lstStyle/>
+          <a:p>
+            <a:pPr algn="ctr"/>
+            <a:r>
+              <a:rPr lang="fr-FR" smtClean="0"/>
+              <a:t>Contexte</a:t>
+            </a:r>
+            <a:endParaRPr lang="fr-FR"/>
+          </a:p>
+        </p:txBody>
+      </p:sp>
+      <p:sp>
+        <p:nvSpPr>
+          <p:cNvPr id="3" name="Espace réservé du contenu 2"/>
+          <p:cNvSpPr>
+            <a:spLocks noGrp="1"/>
+          </p:cNvSpPr>
+          <p:nvPr>
+            <p:ph idx="1"/>
+          </p:nvPr>
+        </p:nvSpPr>
+        <p:spPr/>
+        <p:txBody>
+          <a:bodyPr/>
+          <a:lstStyle/>
+          <a:p>
+            <a:pPr algn="ctr"/>
+            <a:r>
+              <a:rPr lang="fr-FR" sz="2800" smtClean="0"/>
+              <a:t>Calendrier</a:t>
+            </a:r>
+          </a:p>
+          <a:p>
+            <a:pPr algn="ctr"/>
+            <a:endParaRPr lang="fr-FR"/>
+          </a:p>
+          <a:p>
+            <a:r>
+              <a:rPr lang="fr-FR" smtClean="0"/>
+              <a:t>Rapport de conception </a:t>
+            </a:r>
+            <a:r>
+              <a:rPr lang="fr-FR"/>
+              <a:t>: </a:t>
+            </a:r>
+            <a:endParaRPr lang="fr-FR"/>
+          </a:p>
+          <a:p>
+            <a:r>
+              <a:rPr lang="fr-FR" smtClean="0"/>
+              <a:t>Rapport de j’sais plus quoi : </a:t>
+            </a:r>
+            <a:endParaRPr lang="fr-FR"/>
+          </a:p>
+          <a:p>
+            <a:r>
+              <a:rPr lang="fr-FR"/>
+              <a:t>Livraison : </a:t>
+            </a:r>
+            <a:r>
+              <a:rPr lang="fr-FR"/>
+              <a:t>28 </a:t>
+            </a:r>
+            <a:r>
+              <a:rPr lang="fr-FR" smtClean="0"/>
+              <a:t>mai</a:t>
+            </a:r>
+          </a:p>
+          <a:p>
+            <a:endParaRPr lang="fr-FR"/>
+          </a:p>
+          <a:p>
+            <a:r>
+              <a:rPr lang="fr-FR" smtClean="0"/>
+              <a:t>Semaines bloquées</a:t>
+            </a:r>
+            <a:endParaRPr lang="fr-FR"/>
+          </a:p>
+          <a:p>
+            <a:r>
+              <a:rPr lang="fr-FR"/>
+              <a:t>16/12 ; 20/05 </a:t>
+            </a:r>
+            <a:r>
+              <a:rPr lang="fr-FR"/>
+              <a:t>; </a:t>
+            </a:r>
+            <a:r>
+              <a:rPr lang="fr-FR" smtClean="0"/>
+              <a:t>26/05</a:t>
+            </a:r>
+          </a:p>
+          <a:p>
+            <a:endParaRPr lang="fr-FR"/>
+          </a:p>
+          <a:p>
+            <a:r>
+              <a:rPr lang="fr-FR" smtClean="0"/>
+              <a:t>Vacances</a:t>
+            </a:r>
+            <a:endParaRPr lang="fr-FR"/>
+          </a:p>
+          <a:p>
+            <a:r>
+              <a:rPr lang="fr-FR"/>
+              <a:t>du 22/12/2013 au 17/01/2014</a:t>
+            </a:r>
+          </a:p>
+          <a:p>
+            <a:r>
+              <a:rPr lang="fr-FR"/>
+              <a:t>du 27/04/2014 au 16/05/2014.</a:t>
+            </a:r>
+          </a:p>
+        </p:txBody>
+      </p:sp>
+    </p:spTree>
+  </p:cSld>
+  <p:clrMapOvr>
+    <a:masterClrMapping/>
+  </p:clrMapOvr>
+  <p:timing>
+    <p:tnLst>
+      <p:par>
+        <p:cTn id="1" dur="indefinite" restart="never" nodeType="tmRoot"/>
+      </p:par>
+    </p:tnLst>
+  </p:timing>
+</p:sld>
+</file>
+
+<file path=ppt/slides/slide13.xml><?xml version="1.0" encoding="utf-8"?>
+<p:sld xmlns:a="http://schemas.openxmlformats.org/drawingml/2006/main" xmlns:r="http://schemas.openxmlformats.org/officeDocument/2006/relationships" xmlns:p="http://schemas.openxmlformats.org/presentationml/2006/main">
+  <p:cSld>
+    <p:spTree>
+      <p:nvGrpSpPr>
+        <p:cNvPr id="1" name=""/>
+        <p:cNvGrpSpPr/>
+        <p:nvPr/>
+      </p:nvGrpSpPr>
+      <p:grpSpPr>
+        <a:xfrm>
+          <a:off x="0" y="0"/>
+          <a:ext cx="0" cy="0"/>
+          <a:chOff x="0" y="0"/>
+          <a:chExt cx="0" cy="0"/>
+        </a:xfrm>
+      </p:grpSpPr>
+      <p:sp>
+        <p:nvSpPr>
+          <p:cNvPr id="2" name="Titre 1"/>
+          <p:cNvSpPr>
+            <a:spLocks noGrp="1"/>
+          </p:cNvSpPr>
+          <p:nvPr>
+            <p:ph type="title"/>
+          </p:nvPr>
+        </p:nvSpPr>
+        <p:spPr/>
+        <p:txBody>
+          <a:bodyPr/>
+          <a:lstStyle/>
+          <a:p>
+            <a:endParaRPr lang="fr-FR"/>
+          </a:p>
+        </p:txBody>
+      </p:sp>
+      <p:sp>
+        <p:nvSpPr>
+          <p:cNvPr id="3" name="Espace réservé du contenu 2"/>
+          <p:cNvSpPr>
+            <a:spLocks noGrp="1"/>
+          </p:cNvSpPr>
+          <p:nvPr>
+            <p:ph idx="1"/>
+          </p:nvPr>
+        </p:nvSpPr>
+        <p:spPr>
+          <a:xfrm>
+            <a:off x="457200" y="2780928"/>
+            <a:ext cx="8229600" cy="3528392"/>
+          </a:xfrm>
+        </p:spPr>
+        <p:txBody>
+          <a:bodyPr>
+            <a:noAutofit/>
+          </a:bodyPr>
+          <a:lstStyle/>
+          <a:p>
+            <a:pPr algn="ctr"/>
+            <a:r>
+              <a:rPr lang="fr-FR" sz="5400" smtClean="0"/>
+              <a:t>Organisation</a:t>
+            </a:r>
+            <a:endParaRPr lang="fr-FR" sz="5400"/>
+          </a:p>
+        </p:txBody>
+      </p:sp>
+    </p:spTree>
+  </p:cSld>
+  <p:clrMapOvr>
+    <a:masterClrMapping/>
+  </p:clrMapOvr>
+</p:sld>
+</file>
+
+<file path=ppt/slides/slide14.xml><?xml version="1.0" encoding="utf-8"?>
+<p:sld xmlns:a="http://schemas.openxmlformats.org/drawingml/2006/main" xmlns:r="http://schemas.openxmlformats.org/officeDocument/2006/relationships" xmlns:p="http://schemas.openxmlformats.org/presentationml/2006/main">
+  <p:cSld>
+    <p:spTree>
+      <p:nvGrpSpPr>
+        <p:cNvPr id="1" name=""/>
+        <p:cNvGrpSpPr/>
+        <p:nvPr/>
+      </p:nvGrpSpPr>
+      <p:grpSpPr>
+        <a:xfrm>
+          <a:off x="0" y="0"/>
+          <a:ext cx="0" cy="0"/>
+          <a:chOff x="0" y="0"/>
+          <a:chExt cx="0" cy="0"/>
+        </a:xfrm>
+      </p:grpSpPr>
+      <p:sp>
+        <p:nvSpPr>
+          <p:cNvPr id="2" name="Titre 1"/>
+          <p:cNvSpPr>
+            <a:spLocks noGrp="1"/>
+          </p:cNvSpPr>
+          <p:nvPr>
+            <p:ph type="title"/>
+          </p:nvPr>
+        </p:nvSpPr>
+        <p:spPr/>
+        <p:txBody>
+          <a:bodyPr/>
+          <a:lstStyle/>
+          <a:p>
+            <a:pPr algn="ctr"/>
+            <a:r>
+              <a:rPr lang="fr-FR" smtClean="0"/>
+              <a:t>Organisation</a:t>
+            </a:r>
+            <a:endParaRPr lang="fr-FR"/>
+          </a:p>
+        </p:txBody>
+      </p:sp>
+      <p:sp>
+        <p:nvSpPr>
+          <p:cNvPr id="3" name="Espace réservé du contenu 2"/>
+          <p:cNvSpPr>
+            <a:spLocks noGrp="1"/>
+          </p:cNvSpPr>
+          <p:nvPr>
+            <p:ph idx="1"/>
+          </p:nvPr>
+        </p:nvSpPr>
+        <p:spPr/>
+        <p:txBody>
+          <a:bodyPr/>
+          <a:lstStyle/>
+          <a:p>
+            <a:pPr algn="ctr"/>
+            <a:r>
+              <a:rPr lang="fr-FR" sz="2800" smtClean="0"/>
+              <a:t>Méthode SCRUM</a:t>
+            </a:r>
+          </a:p>
+          <a:p>
+            <a:pPr algn="ctr"/>
+            <a:endParaRPr lang="fr-FR"/>
+          </a:p>
+          <a:p>
+            <a:r>
+              <a:rPr lang="fr-FR" smtClean="0"/>
+              <a:t>Blablabla</a:t>
+            </a:r>
+            <a:endParaRPr lang="fr-FR"/>
+          </a:p>
+        </p:txBody>
+      </p:sp>
+    </p:spTree>
+  </p:cSld>
+  <p:clrMapOvr>
+    <a:masterClrMapping/>
+  </p:clrMapOvr>
+  <p:timing>
+    <p:tnLst>
+      <p:par>
+        <p:cTn id="1" dur="indefinite" restart="never" nodeType="tmRoot"/>
+      </p:par>
+    </p:tnLst>
+  </p:timing>
+</p:sld>
+</file>
+
+<file path=ppt/slides/slide15.xml><?xml version="1.0" encoding="utf-8"?>
+<p:sld xmlns:a="http://schemas.openxmlformats.org/drawingml/2006/main" xmlns:r="http://schemas.openxmlformats.org/officeDocument/2006/relationships" xmlns:p="http://schemas.openxmlformats.org/presentationml/2006/main">
+  <p:cSld>
+    <p:spTree>
+      <p:nvGrpSpPr>
+        <p:cNvPr id="1" name=""/>
+        <p:cNvGrpSpPr/>
+        <p:nvPr/>
+      </p:nvGrpSpPr>
+      <p:grpSpPr>
+        <a:xfrm>
+          <a:off x="0" y="0"/>
+          <a:ext cx="0" cy="0"/>
+          <a:chOff x="0" y="0"/>
+          <a:chExt cx="0" cy="0"/>
+        </a:xfrm>
+      </p:grpSpPr>
+      <p:sp>
+        <p:nvSpPr>
+          <p:cNvPr id="2" name="Titre 1"/>
+          <p:cNvSpPr>
+            <a:spLocks noGrp="1"/>
+          </p:cNvSpPr>
+          <p:nvPr>
+            <p:ph type="title"/>
+          </p:nvPr>
+        </p:nvSpPr>
+        <p:spPr/>
+        <p:txBody>
+          <a:bodyPr/>
+          <a:lstStyle/>
+          <a:p>
+            <a:pPr algn="ctr"/>
+            <a:r>
+              <a:rPr lang="fr-FR" smtClean="0"/>
+              <a:t>Organisation</a:t>
+            </a:r>
+            <a:endParaRPr lang="fr-FR"/>
+          </a:p>
+        </p:txBody>
+      </p:sp>
+      <p:sp>
+        <p:nvSpPr>
+          <p:cNvPr id="3" name="Espace réservé du contenu 2"/>
+          <p:cNvSpPr>
+            <a:spLocks noGrp="1"/>
+          </p:cNvSpPr>
+          <p:nvPr>
+            <p:ph idx="1"/>
+          </p:nvPr>
+        </p:nvSpPr>
+        <p:spPr/>
+        <p:txBody>
+          <a:bodyPr/>
+          <a:lstStyle/>
+          <a:p>
+            <a:pPr algn="ctr"/>
+            <a:r>
+              <a:rPr lang="fr-FR" sz="2800" smtClean="0"/>
+              <a:t>Répartition des rôles</a:t>
+            </a:r>
+          </a:p>
+          <a:p>
+            <a:pPr algn="ctr"/>
+            <a:endParaRPr lang="fr-FR"/>
+          </a:p>
+          <a:p>
+            <a:pPr algn="ctr"/>
+            <a:r>
+              <a:rPr lang="fr-FR" smtClean="0"/>
+              <a:t>ADTool			Algorithmie			Glasir</a:t>
+            </a:r>
+            <a:endParaRPr lang="fr-FR"/>
+          </a:p>
+        </p:txBody>
+      </p:sp>
+    </p:spTree>
+  </p:cSld>
+  <p:clrMapOvr>
+    <a:masterClrMapping/>
+  </p:clrMapOvr>
+  <p:timing>
+    <p:tnLst>
+      <p:par>
+        <p:cTn id="1" dur="indefinite" restart="never" nodeType="tmRoot"/>
+      </p:par>
+    </p:tnLst>
+  </p:timing>
+</p:sld>
+</file>
+
+<file path=ppt/slides/slide16.xml><?xml version="1.0" encoding="utf-8"?>
+<p:sld xmlns:a="http://schemas.openxmlformats.org/drawingml/2006/main" xmlns:r="http://schemas.openxmlformats.org/officeDocument/2006/relationships" xmlns:p="http://schemas.openxmlformats.org/presentationml/2006/main">
+  <p:cSld>
+    <p:spTree>
+      <p:nvGrpSpPr>
+        <p:cNvPr id="1" name=""/>
+        <p:cNvGrpSpPr/>
+        <p:nvPr/>
+      </p:nvGrpSpPr>
+      <p:grpSpPr>
+        <a:xfrm>
+          <a:off x="0" y="0"/>
+          <a:ext cx="0" cy="0"/>
+          <a:chOff x="0" y="0"/>
+          <a:chExt cx="0" cy="0"/>
+        </a:xfrm>
+      </p:grpSpPr>
+      <p:sp>
+        <p:nvSpPr>
+          <p:cNvPr id="2" name="Titre 1"/>
+          <p:cNvSpPr>
+            <a:spLocks noGrp="1"/>
+          </p:cNvSpPr>
+          <p:nvPr>
+            <p:ph type="title"/>
+          </p:nvPr>
+        </p:nvSpPr>
+        <p:spPr/>
+        <p:txBody>
+          <a:bodyPr/>
+          <a:lstStyle/>
+          <a:p>
+            <a:pPr algn="ctr"/>
+            <a:r>
+              <a:rPr lang="fr-FR" smtClean="0"/>
+              <a:t>Organisation</a:t>
+            </a:r>
+            <a:endParaRPr lang="fr-FR"/>
+          </a:p>
+        </p:txBody>
+      </p:sp>
+      <p:sp>
+        <p:nvSpPr>
+          <p:cNvPr id="3" name="Espace réservé du contenu 2"/>
+          <p:cNvSpPr>
+            <a:spLocks noGrp="1"/>
+          </p:cNvSpPr>
+          <p:nvPr>
+            <p:ph idx="1"/>
+          </p:nvPr>
+        </p:nvSpPr>
+        <p:spPr/>
+        <p:txBody>
+          <a:bodyPr/>
+          <a:lstStyle/>
+          <a:p>
+            <a:pPr algn="ctr"/>
+            <a:r>
+              <a:rPr lang="fr-FR" sz="2800" smtClean="0"/>
+              <a:t>Cycle de qualification</a:t>
+            </a:r>
+            <a:endParaRPr lang="fr-FR" smtClean="0"/>
+          </a:p>
+          <a:p>
+            <a:endParaRPr lang="fr-FR" smtClean="0"/>
+          </a:p>
+          <a:p>
+            <a:r>
+              <a:rPr lang="fr-FR" smtClean="0"/>
+              <a:t>Fo testé et fair la dokumentassion o fur et a mesur urh urh</a:t>
+            </a:r>
+          </a:p>
+          <a:p>
+            <a:r>
+              <a:rPr lang="fr-FR" smtClean="0"/>
+              <a:t>Herp derp</a:t>
+            </a:r>
+            <a:endParaRPr lang="fr-FR"/>
+          </a:p>
+          <a:p>
+            <a:endParaRPr lang="fr-FR" sz="2800" smtClean="0"/>
+          </a:p>
+        </p:txBody>
+      </p:sp>
+    </p:spTree>
+  </p:cSld>
+  <p:clrMapOvr>
+    <a:masterClrMapping/>
+  </p:clrMapOvr>
+  <p:timing>
+    <p:tnLst>
+      <p:par>
+        <p:cTn id="1" dur="indefinite" restart="never" nodeType="tmRoot"/>
+      </p:par>
+    </p:tnLst>
+  </p:timing>
+</p:sld>
+</file>
+
+<file path=ppt/slides/slide17.xml><?xml version="1.0" encoding="utf-8"?>
+<p:sld xmlns:a="http://schemas.openxmlformats.org/drawingml/2006/main" xmlns:r="http://schemas.openxmlformats.org/officeDocument/2006/relationships" xmlns:p="http://schemas.openxmlformats.org/presentationml/2006/main">
+  <p:cSld>
+    <p:spTree>
+      <p:nvGrpSpPr>
+        <p:cNvPr id="1" name=""/>
+        <p:cNvGrpSpPr/>
+        <p:nvPr/>
+      </p:nvGrpSpPr>
+      <p:grpSpPr>
+        <a:xfrm>
+          <a:off x="0" y="0"/>
+          <a:ext cx="0" cy="0"/>
+          <a:chOff x="0" y="0"/>
+          <a:chExt cx="0" cy="0"/>
+        </a:xfrm>
+      </p:grpSpPr>
+      <p:sp>
+        <p:nvSpPr>
+          <p:cNvPr id="2" name="Titre 1"/>
+          <p:cNvSpPr>
+            <a:spLocks noGrp="1"/>
+          </p:cNvSpPr>
+          <p:nvPr>
+            <p:ph type="title"/>
+          </p:nvPr>
+        </p:nvSpPr>
+        <p:spPr/>
+        <p:txBody>
+          <a:bodyPr/>
+          <a:lstStyle/>
+          <a:p>
+            <a:pPr algn="ctr"/>
+            <a:r>
+              <a:rPr lang="fr-FR" smtClean="0"/>
+              <a:t>Organisation</a:t>
+            </a:r>
+            <a:endParaRPr lang="fr-FR"/>
+          </a:p>
+        </p:txBody>
+      </p:sp>
+      <p:sp>
+        <p:nvSpPr>
+          <p:cNvPr id="3" name="Espace réservé du contenu 2"/>
+          <p:cNvSpPr>
+            <a:spLocks noGrp="1"/>
+          </p:cNvSpPr>
+          <p:nvPr>
+            <p:ph idx="1"/>
+          </p:nvPr>
+        </p:nvSpPr>
+        <p:spPr/>
+        <p:txBody>
+          <a:bodyPr/>
+          <a:lstStyle/>
+          <a:p>
+            <a:pPr algn="ctr"/>
+            <a:r>
+              <a:rPr lang="fr-FR" sz="2800" smtClean="0"/>
+              <a:t>Pilotage du projet</a:t>
+            </a:r>
+            <a:endParaRPr lang="fr-FR" smtClean="0"/>
+          </a:p>
+          <a:p>
+            <a:endParaRPr lang="fr-FR" smtClean="0"/>
+          </a:p>
+          <a:p>
+            <a:r>
+              <a:rPr lang="fr-FR" smtClean="0"/>
+              <a:t>Pilotage par les délais</a:t>
+            </a:r>
+          </a:p>
+          <a:p>
+            <a:r>
+              <a:rPr lang="fr-FR" smtClean="0"/>
+              <a:t>Pilotage par le fait que certaines tâches doivent être faites avant d’autres</a:t>
+            </a:r>
+            <a:endParaRPr lang="fr-FR"/>
+          </a:p>
+          <a:p>
+            <a:endParaRPr lang="fr-FR" sz="2800" smtClean="0"/>
+          </a:p>
+        </p:txBody>
+      </p:sp>
+    </p:spTree>
+  </p:cSld>
+  <p:clrMapOvr>
+    <a:masterClrMapping/>
+  </p:clrMapOvr>
+  <p:timing>
+    <p:tnLst>
+      <p:par>
+        <p:cTn id="1" dur="indefinite" restart="never" nodeType="tmRoot"/>
+      </p:par>
+    </p:tnLst>
+  </p:timing>
+</p:sld>
+</file>
+
+<file path=ppt/slides/slide18.xml><?xml version="1.0" encoding="utf-8"?>
+<p:sld xmlns:a="http://schemas.openxmlformats.org/drawingml/2006/main" xmlns:r="http://schemas.openxmlformats.org/officeDocument/2006/relationships" xmlns:p="http://schemas.openxmlformats.org/presentationml/2006/main">
+  <p:cSld>
+    <p:spTree>
+      <p:nvGrpSpPr>
+        <p:cNvPr id="1" name=""/>
+        <p:cNvGrpSpPr/>
+        <p:nvPr/>
+      </p:nvGrpSpPr>
+      <p:grpSpPr>
+        <a:xfrm>
+          <a:off x="0" y="0"/>
+          <a:ext cx="0" cy="0"/>
+          <a:chOff x="0" y="0"/>
+          <a:chExt cx="0" cy="0"/>
+        </a:xfrm>
+      </p:grpSpPr>
+      <p:sp>
+        <p:nvSpPr>
+          <p:cNvPr id="2" name="Titre 1"/>
+          <p:cNvSpPr>
+            <a:spLocks noGrp="1"/>
+          </p:cNvSpPr>
+          <p:nvPr>
+            <p:ph type="title"/>
+          </p:nvPr>
+        </p:nvSpPr>
+        <p:spPr/>
+        <p:txBody>
+          <a:bodyPr/>
+          <a:lstStyle/>
+          <a:p>
+            <a:endParaRPr lang="fr-FR"/>
+          </a:p>
+        </p:txBody>
+      </p:sp>
+      <p:sp>
+        <p:nvSpPr>
+          <p:cNvPr id="3" name="Espace réservé du contenu 2"/>
+          <p:cNvSpPr>
+            <a:spLocks noGrp="1"/>
+          </p:cNvSpPr>
+          <p:nvPr>
+            <p:ph idx="1"/>
+          </p:nvPr>
+        </p:nvSpPr>
+        <p:spPr>
+          <a:xfrm>
+            <a:off x="457200" y="2780928"/>
+            <a:ext cx="8229600" cy="3528392"/>
+          </a:xfrm>
+        </p:spPr>
+        <p:txBody>
+          <a:bodyPr>
+            <a:noAutofit/>
+          </a:bodyPr>
+          <a:lstStyle/>
+          <a:p>
+            <a:pPr algn="ctr"/>
+            <a:r>
+              <a:rPr lang="fr-FR" sz="5400" smtClean="0"/>
+              <a:t>Planification</a:t>
+            </a:r>
+            <a:endParaRPr lang="fr-FR" sz="5400"/>
+          </a:p>
+        </p:txBody>
+      </p:sp>
+    </p:spTree>
+  </p:cSld>
+  <p:clrMapOvr>
+    <a:masterClrMapping/>
+  </p:clrMapOvr>
+</p:sld>
+</file>
+
+<file path=ppt/slides/slide19.xml><?xml version="1.0" encoding="utf-8"?>
+<p:sld xmlns:a="http://schemas.openxmlformats.org/drawingml/2006/main" xmlns:r="http://schemas.openxmlformats.org/officeDocument/2006/relationships" xmlns:p="http://schemas.openxmlformats.org/presentationml/2006/main">
+  <p:cSld>
+    <p:spTree>
+      <p:nvGrpSpPr>
+        <p:cNvPr id="1" name=""/>
+        <p:cNvGrpSpPr/>
+        <p:nvPr/>
+      </p:nvGrpSpPr>
+      <p:grpSpPr>
+        <a:xfrm>
+          <a:off x="0" y="0"/>
+          <a:ext cx="0" cy="0"/>
+          <a:chOff x="0" y="0"/>
+          <a:chExt cx="0" cy="0"/>
+        </a:xfrm>
+      </p:grpSpPr>
+      <p:sp>
+        <p:nvSpPr>
+          <p:cNvPr id="2" name="Titre 1"/>
+          <p:cNvSpPr>
+            <a:spLocks noGrp="1"/>
+          </p:cNvSpPr>
+          <p:nvPr>
+            <p:ph type="title"/>
+          </p:nvPr>
+        </p:nvSpPr>
+        <p:spPr/>
+        <p:txBody>
+          <a:bodyPr/>
+          <a:lstStyle/>
+          <a:p>
+            <a:pPr algn="ctr"/>
+            <a:r>
+              <a:rPr lang="fr-FR" smtClean="0"/>
+              <a:t>Planification</a:t>
+            </a:r>
+            <a:endParaRPr lang="fr-FR"/>
+          </a:p>
+        </p:txBody>
+      </p:sp>
+      <p:sp>
+        <p:nvSpPr>
+          <p:cNvPr id="3" name="Espace réservé du contenu 2"/>
+          <p:cNvSpPr>
+            <a:spLocks noGrp="1"/>
+          </p:cNvSpPr>
+          <p:nvPr>
+            <p:ph idx="1"/>
+          </p:nvPr>
+        </p:nvSpPr>
+        <p:spPr/>
+        <p:txBody>
+          <a:bodyPr/>
+          <a:lstStyle/>
+          <a:p>
+            <a:pPr algn="ctr"/>
+            <a:r>
+              <a:rPr lang="fr-FR" sz="2800" smtClean="0"/>
+              <a:t>Méthode d’estimation</a:t>
+            </a:r>
+            <a:endParaRPr lang="fr-FR" smtClean="0"/>
+          </a:p>
+          <a:p>
+            <a:endParaRPr lang="fr-FR" smtClean="0"/>
+          </a:p>
+          <a:p>
+            <a:r>
+              <a:rPr lang="fr-FR" smtClean="0"/>
+              <a:t>Analogique </a:t>
+            </a:r>
+            <a:r>
+              <a:rPr lang="fr-FR" smtClean="0">
+                <a:sym typeface="Wingdings" pitchFamily="2" charset="2"/>
+              </a:rPr>
+              <a:t> comparaison experience vécues (projet poo)</a:t>
+            </a:r>
+            <a:endParaRPr lang="fr-FR" smtClean="0"/>
+          </a:p>
+          <a:p>
+            <a:r>
+              <a:rPr lang="fr-FR" smtClean="0"/>
+              <a:t>Expertise </a:t>
+            </a:r>
+            <a:r>
+              <a:rPr lang="fr-FR" smtClean="0">
+                <a:sym typeface="Wingdings" pitchFamily="2" charset="2"/>
+              </a:rPr>
+              <a:t> jugement à partir de nos stages</a:t>
+            </a:r>
+            <a:endParaRPr lang="fr-FR"/>
+          </a:p>
+          <a:p>
+            <a:endParaRPr lang="fr-FR" sz="2800" smtClean="0"/>
           </a:p>
         </p:txBody>
       </p:sp>
@@ -5695,7 +6584,15 @@
             </a:pPr>
             <a:r>
               <a:rPr lang="fr-FR" smtClean="0"/>
-              <a:t>Elements d’entrée</a:t>
+              <a:t>É</a:t>
+            </a:r>
+            <a:r>
+              <a:rPr lang="fr-FR" smtClean="0"/>
+              <a:t>lements </a:t>
+            </a:r>
+            <a:r>
+              <a:rPr lang="fr-FR" smtClean="0"/>
+              <a:t>d’entrée</a:t>
             </a:r>
           </a:p>
           <a:p>
@@ -5737,6 +6634,7 @@
               <a:rPr lang="fr-FR" smtClean="0"/>
               <a:t>Méthode</a:t>
             </a:r>
+            <a:endParaRPr lang="fr-FR" smtClean="0"/>
           </a:p>
           <a:p>
             <a:pPr lvl="1">
@@ -5755,8 +6653,19 @@
             </a:pPr>
             <a:r>
               <a:rPr lang="fr-FR" smtClean="0"/>
-              <a:t>Pilotage</a:t>
-            </a:r>
+              <a:t>Cycle de qualification</a:t>
+            </a:r>
+          </a:p>
+          <a:p>
+            <a:pPr lvl="1">
+              <a:buFontTx/>
+              <a:buChar char="-"/>
+            </a:pPr>
+            <a:r>
+              <a:rPr lang="fr-FR" smtClean="0"/>
+              <a:t>Pilotage du projet</a:t>
+            </a:r>
+            <a:endParaRPr lang="fr-FR" smtClean="0"/>
           </a:p>
           <a:p>
             <a:pPr>
@@ -5808,6 +6717,401 @@
   <p:clrMapOvr>
     <a:masterClrMapping/>
   </p:clrMapOvr>
+</p:sld>
+</file>
+
+<file path=ppt/slides/slide20.xml><?xml version="1.0" encoding="utf-8"?>
+<p:sld xmlns:a="http://schemas.openxmlformats.org/drawingml/2006/main" xmlns:r="http://schemas.openxmlformats.org/officeDocument/2006/relationships" xmlns:p="http://schemas.openxmlformats.org/presentationml/2006/main">
+  <p:cSld>
+    <p:spTree>
+      <p:nvGrpSpPr>
+        <p:cNvPr id="1" name=""/>
+        <p:cNvGrpSpPr/>
+        <p:nvPr/>
+      </p:nvGrpSpPr>
+      <p:grpSpPr>
+        <a:xfrm>
+          <a:off x="0" y="0"/>
+          <a:ext cx="0" cy="0"/>
+          <a:chOff x="0" y="0"/>
+          <a:chExt cx="0" cy="0"/>
+        </a:xfrm>
+      </p:grpSpPr>
+      <p:sp>
+        <p:nvSpPr>
+          <p:cNvPr id="2" name="Titre 1"/>
+          <p:cNvSpPr>
+            <a:spLocks noGrp="1"/>
+          </p:cNvSpPr>
+          <p:nvPr>
+            <p:ph type="title"/>
+          </p:nvPr>
+        </p:nvSpPr>
+        <p:spPr/>
+        <p:txBody>
+          <a:bodyPr/>
+          <a:lstStyle/>
+          <a:p>
+            <a:pPr algn="ctr"/>
+            <a:r>
+              <a:rPr lang="fr-FR" smtClean="0"/>
+              <a:t>Planification</a:t>
+            </a:r>
+            <a:endParaRPr lang="fr-FR"/>
+          </a:p>
+        </p:txBody>
+      </p:sp>
+      <p:sp>
+        <p:nvSpPr>
+          <p:cNvPr id="3" name="Espace réservé du contenu 2"/>
+          <p:cNvSpPr>
+            <a:spLocks noGrp="1"/>
+          </p:cNvSpPr>
+          <p:nvPr>
+            <p:ph idx="1"/>
+          </p:nvPr>
+        </p:nvSpPr>
+        <p:spPr/>
+        <p:txBody>
+          <a:bodyPr/>
+          <a:lstStyle/>
+          <a:p>
+            <a:pPr algn="ctr"/>
+            <a:r>
+              <a:rPr lang="fr-FR" sz="2800" smtClean="0"/>
+              <a:t>Planning</a:t>
+            </a:r>
+            <a:endParaRPr lang="fr-FR" smtClean="0"/>
+          </a:p>
+          <a:p>
+            <a:endParaRPr lang="fr-FR" smtClean="0"/>
+          </a:p>
+          <a:p>
+            <a:r>
+              <a:rPr lang="fr-FR" smtClean="0"/>
+              <a:t>Vue d’ensemble</a:t>
+            </a:r>
+          </a:p>
+          <a:p>
+            <a:endParaRPr lang="fr-FR"/>
+          </a:p>
+          <a:p>
+            <a:pPr algn="ctr"/>
+            <a:r>
+              <a:rPr lang="fr-FR" smtClean="0"/>
+              <a:t>Bô schéma</a:t>
+            </a:r>
+            <a:endParaRPr lang="fr-FR"/>
+          </a:p>
+          <a:p>
+            <a:endParaRPr lang="fr-FR" sz="2800" smtClean="0"/>
+          </a:p>
+        </p:txBody>
+      </p:sp>
+    </p:spTree>
+  </p:cSld>
+  <p:clrMapOvr>
+    <a:masterClrMapping/>
+  </p:clrMapOvr>
+  <p:timing>
+    <p:tnLst>
+      <p:par>
+        <p:cTn id="1" dur="indefinite" restart="never" nodeType="tmRoot"/>
+      </p:par>
+    </p:tnLst>
+  </p:timing>
+</p:sld>
+</file>
+
+<file path=ppt/slides/slide21.xml><?xml version="1.0" encoding="utf-8"?>
+<p:sld xmlns:a="http://schemas.openxmlformats.org/drawingml/2006/main" xmlns:r="http://schemas.openxmlformats.org/officeDocument/2006/relationships" xmlns:p="http://schemas.openxmlformats.org/presentationml/2006/main">
+  <p:cSld>
+    <p:spTree>
+      <p:nvGrpSpPr>
+        <p:cNvPr id="1" name=""/>
+        <p:cNvGrpSpPr/>
+        <p:nvPr/>
+      </p:nvGrpSpPr>
+      <p:grpSpPr>
+        <a:xfrm>
+          <a:off x="0" y="0"/>
+          <a:ext cx="0" cy="0"/>
+          <a:chOff x="0" y="0"/>
+          <a:chExt cx="0" cy="0"/>
+        </a:xfrm>
+      </p:grpSpPr>
+      <p:sp>
+        <p:nvSpPr>
+          <p:cNvPr id="2" name="Titre 1"/>
+          <p:cNvSpPr>
+            <a:spLocks noGrp="1"/>
+          </p:cNvSpPr>
+          <p:nvPr>
+            <p:ph type="title"/>
+          </p:nvPr>
+        </p:nvSpPr>
+        <p:spPr/>
+        <p:txBody>
+          <a:bodyPr/>
+          <a:lstStyle/>
+          <a:p>
+            <a:pPr algn="ctr"/>
+            <a:r>
+              <a:rPr lang="fr-FR" smtClean="0"/>
+              <a:t>Planification</a:t>
+            </a:r>
+            <a:endParaRPr lang="fr-FR"/>
+          </a:p>
+        </p:txBody>
+      </p:sp>
+      <p:sp>
+        <p:nvSpPr>
+          <p:cNvPr id="3" name="Espace réservé du contenu 2"/>
+          <p:cNvSpPr>
+            <a:spLocks noGrp="1"/>
+          </p:cNvSpPr>
+          <p:nvPr>
+            <p:ph idx="1"/>
+          </p:nvPr>
+        </p:nvSpPr>
+        <p:spPr/>
+        <p:txBody>
+          <a:bodyPr/>
+          <a:lstStyle/>
+          <a:p>
+            <a:pPr algn="ctr"/>
+            <a:r>
+              <a:rPr lang="fr-FR" sz="2800" smtClean="0"/>
+              <a:t>Planning MS Project</a:t>
+            </a:r>
+            <a:endParaRPr lang="fr-FR" smtClean="0"/>
+          </a:p>
+          <a:p>
+            <a:endParaRPr lang="fr-FR" smtClean="0"/>
+          </a:p>
+          <a:p>
+            <a:endParaRPr lang="fr-FR" smtClean="0"/>
+          </a:p>
+          <a:p>
+            <a:endParaRPr lang="fr-FR"/>
+          </a:p>
+          <a:p>
+            <a:pPr algn="ctr"/>
+            <a:r>
+              <a:rPr lang="fr-FR" smtClean="0"/>
+              <a:t>Bô schéma qui lèche les boules</a:t>
+            </a:r>
+            <a:endParaRPr lang="fr-FR"/>
+          </a:p>
+          <a:p>
+            <a:endParaRPr lang="fr-FR" sz="2800" smtClean="0"/>
+          </a:p>
+        </p:txBody>
+      </p:sp>
+    </p:spTree>
+  </p:cSld>
+  <p:clrMapOvr>
+    <a:masterClrMapping/>
+  </p:clrMapOvr>
+  <p:timing>
+    <p:tnLst>
+      <p:par>
+        <p:cTn id="1" dur="indefinite" restart="never" nodeType="tmRoot"/>
+      </p:par>
+    </p:tnLst>
+  </p:timing>
+</p:sld>
+</file>
+
+<file path=ppt/slides/slide22.xml><?xml version="1.0" encoding="utf-8"?>
+<p:sld xmlns:a="http://schemas.openxmlformats.org/drawingml/2006/main" xmlns:r="http://schemas.openxmlformats.org/officeDocument/2006/relationships" xmlns:p="http://schemas.openxmlformats.org/presentationml/2006/main">
+  <p:cSld>
+    <p:spTree>
+      <p:nvGrpSpPr>
+        <p:cNvPr id="1" name=""/>
+        <p:cNvGrpSpPr/>
+        <p:nvPr/>
+      </p:nvGrpSpPr>
+      <p:grpSpPr>
+        <a:xfrm>
+          <a:off x="0" y="0"/>
+          <a:ext cx="0" cy="0"/>
+          <a:chOff x="0" y="0"/>
+          <a:chExt cx="0" cy="0"/>
+        </a:xfrm>
+      </p:grpSpPr>
+      <p:sp>
+        <p:nvSpPr>
+          <p:cNvPr id="2" name="Titre 1"/>
+          <p:cNvSpPr>
+            <a:spLocks noGrp="1"/>
+          </p:cNvSpPr>
+          <p:nvPr>
+            <p:ph type="title"/>
+          </p:nvPr>
+        </p:nvSpPr>
+        <p:spPr/>
+        <p:txBody>
+          <a:bodyPr/>
+          <a:lstStyle/>
+          <a:p>
+            <a:pPr algn="ctr"/>
+            <a:endParaRPr lang="fr-FR"/>
+          </a:p>
+        </p:txBody>
+      </p:sp>
+      <p:sp>
+        <p:nvSpPr>
+          <p:cNvPr id="3" name="Espace réservé du contenu 2"/>
+          <p:cNvSpPr>
+            <a:spLocks noGrp="1"/>
+          </p:cNvSpPr>
+          <p:nvPr>
+            <p:ph idx="1"/>
+          </p:nvPr>
+        </p:nvSpPr>
+        <p:spPr/>
+        <p:txBody>
+          <a:bodyPr/>
+          <a:lstStyle/>
+          <a:p>
+            <a:pPr algn="ctr"/>
+            <a:r>
+              <a:rPr lang="fr-FR" sz="2800" smtClean="0"/>
+              <a:t>Conclusion</a:t>
+            </a:r>
+            <a:endParaRPr lang="fr-FR" smtClean="0"/>
+          </a:p>
+          <a:p>
+            <a:endParaRPr lang="fr-FR" smtClean="0"/>
+          </a:p>
+          <a:p>
+            <a:endParaRPr lang="fr-FR" smtClean="0"/>
+          </a:p>
+          <a:p>
+            <a:endParaRPr lang="fr-FR"/>
+          </a:p>
+          <a:p>
+            <a:pPr algn="ctr"/>
+            <a:r>
+              <a:rPr lang="fr-FR" smtClean="0"/>
+              <a:t>On a bien léché tes boules</a:t>
+            </a:r>
+            <a:endParaRPr lang="fr-FR"/>
+          </a:p>
+          <a:p>
+            <a:endParaRPr lang="fr-FR" sz="2800" smtClean="0"/>
+          </a:p>
+        </p:txBody>
+      </p:sp>
+    </p:spTree>
+  </p:cSld>
+  <p:clrMapOvr>
+    <a:masterClrMapping/>
+  </p:clrMapOvr>
+  <p:timing>
+    <p:tnLst>
+      <p:par>
+        <p:cTn id="1" dur="indefinite" restart="never" nodeType="tmRoot"/>
+      </p:par>
+    </p:tnLst>
+  </p:timing>
+</p:sld>
+</file>
+
+<file path=ppt/slides/slide23.xml><?xml version="1.0" encoding="utf-8"?>
+<p:sld xmlns:a="http://schemas.openxmlformats.org/drawingml/2006/main" xmlns:r="http://schemas.openxmlformats.org/officeDocument/2006/relationships" xmlns:p="http://schemas.openxmlformats.org/presentationml/2006/main">
+  <p:cSld>
+    <p:spTree>
+      <p:nvGrpSpPr>
+        <p:cNvPr id="1" name=""/>
+        <p:cNvGrpSpPr/>
+        <p:nvPr/>
+      </p:nvGrpSpPr>
+      <p:grpSpPr>
+        <a:xfrm>
+          <a:off x="0" y="0"/>
+          <a:ext cx="0" cy="0"/>
+          <a:chOff x="0" y="0"/>
+          <a:chExt cx="0" cy="0"/>
+        </a:xfrm>
+      </p:grpSpPr>
+      <p:sp>
+        <p:nvSpPr>
+          <p:cNvPr id="2" name="Titre 1"/>
+          <p:cNvSpPr>
+            <a:spLocks noGrp="1"/>
+          </p:cNvSpPr>
+          <p:nvPr>
+            <p:ph type="title"/>
+          </p:nvPr>
+        </p:nvSpPr>
+        <p:spPr/>
+        <p:txBody>
+          <a:bodyPr/>
+          <a:lstStyle/>
+          <a:p>
+            <a:pPr algn="ctr"/>
+            <a:endParaRPr lang="fr-FR"/>
+          </a:p>
+        </p:txBody>
+      </p:sp>
+      <p:sp>
+        <p:nvSpPr>
+          <p:cNvPr id="3" name="Espace réservé du contenu 2"/>
+          <p:cNvSpPr>
+            <a:spLocks noGrp="1"/>
+          </p:cNvSpPr>
+          <p:nvPr>
+            <p:ph idx="1"/>
+          </p:nvPr>
+        </p:nvSpPr>
+        <p:spPr/>
+        <p:txBody>
+          <a:bodyPr/>
+          <a:lstStyle/>
+          <a:p>
+            <a:pPr algn="ctr"/>
+            <a:endParaRPr lang="fr-FR" sz="2800" smtClean="0"/>
+          </a:p>
+          <a:p>
+            <a:pPr algn="ctr"/>
+            <a:endParaRPr lang="fr-FR" sz="2800"/>
+          </a:p>
+          <a:p>
+            <a:pPr algn="ctr"/>
+            <a:r>
+              <a:rPr lang="fr-FR" sz="2800" smtClean="0"/>
+              <a:t>Merci de ton attention enculé</a:t>
+            </a:r>
+            <a:endParaRPr lang="fr-FR" smtClean="0"/>
+          </a:p>
+          <a:p>
+            <a:endParaRPr lang="fr-FR" smtClean="0"/>
+          </a:p>
+          <a:p>
+            <a:endParaRPr lang="fr-FR" smtClean="0"/>
+          </a:p>
+          <a:p>
+            <a:endParaRPr lang="fr-FR"/>
+          </a:p>
+          <a:p>
+            <a:endParaRPr lang="fr-FR" sz="2800" smtClean="0"/>
+          </a:p>
+        </p:txBody>
+      </p:sp>
+    </p:spTree>
+  </p:cSld>
+  <p:clrMapOvr>
+    <a:masterClrMapping/>
+  </p:clrMapOvr>
+  <p:timing>
+    <p:tnLst>
+      <p:par>
+        <p:cTn id="1" dur="indefinite" restart="never" nodeType="tmRoot"/>
+      </p:par>
+    </p:tnLst>
+  </p:timing>
 </p:sld>
 </file>
 
@@ -6347,7 +7651,7 @@
           <a:p>
             <a:pPr algn="ctr"/>
             <a:r>
-              <a:rPr lang="fr-FR" smtClean="0"/>
+              <a:rPr lang="fr-FR" sz="2800" smtClean="0"/>
               <a:t>Acteurs</a:t>
             </a:r>
           </a:p>
@@ -6358,14 +7662,88 @@
           <a:p>
             <a:r>
               <a:rPr lang="fr-FR" smtClean="0"/>
-              <a:t>Trois développeurs</a:t>
-            </a:r>
-          </a:p>
-          <a:p>
-            <a:r>
-              <a:rPr lang="fr-FR" smtClean="0"/>
-              <a:t>Deux encadrants</a:t>
-            </a:r>
+              <a:t>	Trois développeurs</a:t>
+            </a:r>
+          </a:p>
+          <a:p>
+            <a:r>
+              <a:rPr lang="fr-FR"/>
+              <a:t>	</a:t>
+            </a:r>
+            <a:r>
+              <a:rPr lang="fr-FR" smtClean="0"/>
+              <a:t>	Pierre-Marie </a:t>
+            </a:r>
+            <a:r>
+              <a:rPr lang="fr-FR" cap="small" smtClean="0"/>
+              <a:t>Airiau</a:t>
+            </a:r>
+          </a:p>
+          <a:p>
+            <a:r>
+              <a:rPr lang="fr-FR"/>
+              <a:t>	</a:t>
+            </a:r>
+            <a:r>
+              <a:rPr lang="fr-FR" smtClean="0"/>
+              <a:t>	Valentin </a:t>
+            </a:r>
+            <a:r>
+              <a:rPr lang="fr-FR" cap="small" smtClean="0"/>
+              <a:t>Esmieu</a:t>
+            </a:r>
+          </a:p>
+          <a:p>
+            <a:r>
+              <a:rPr lang="fr-FR"/>
+              <a:t>	</a:t>
+            </a:r>
+            <a:r>
+              <a:rPr lang="fr-FR" smtClean="0"/>
+              <a:t>	Maud </a:t>
+            </a:r>
+            <a:r>
+              <a:rPr lang="fr-FR" cap="small" smtClean="0"/>
+              <a:t>Leray</a:t>
+            </a:r>
+          </a:p>
+          <a:p>
+            <a:endParaRPr lang="fr-FR" smtClean="0"/>
+          </a:p>
+          <a:p>
+            <a:r>
+              <a:rPr lang="fr-FR" smtClean="0"/>
+              <a:t>	Deux encadrants</a:t>
+            </a:r>
+          </a:p>
+          <a:p>
+            <a:r>
+              <a:rPr lang="fr-FR"/>
+              <a:t>	</a:t>
+            </a:r>
+            <a:r>
+              <a:rPr lang="fr-FR" smtClean="0"/>
+              <a:t>	Gildas </a:t>
+            </a:r>
+            <a:r>
+              <a:rPr lang="fr-FR" cap="small" smtClean="0"/>
+              <a:t>Avoine</a:t>
+            </a:r>
+          </a:p>
+          <a:p>
+            <a:r>
+              <a:rPr lang="fr-FR"/>
+              <a:t>	</a:t>
+            </a:r>
+            <a:r>
+              <a:rPr lang="fr-FR" smtClean="0"/>
+              <a:t>	Barbara </a:t>
+            </a:r>
+            <a:r>
+              <a:rPr lang="fr-FR" cap="small" smtClean="0"/>
+              <a:t>Kordy</a:t>
+            </a:r>
+            <a:endParaRPr lang="fr-FR" cap="small" smtClean="0"/>
           </a:p>
         </p:txBody>
       </p:sp>
@@ -6442,7 +7820,7 @@
           <a:p>
             <a:pPr algn="ctr"/>
             <a:r>
-              <a:rPr lang="fr-FR" smtClean="0"/>
+              <a:rPr lang="fr-FR" sz="2800" smtClean="0"/>
               <a:t>Périmètre fonctionnel</a:t>
             </a:r>
           </a:p>
@@ -6454,6 +7832,55 @@
             <a:r>
               <a:rPr lang="fr-FR" smtClean="0"/>
               <a:t>Logiciel destiné </a:t>
+            </a:r>
+            <a:r>
+              <a:rPr lang="fr-FR" smtClean="0"/>
+              <a:t>aux experts en sécurité</a:t>
+            </a:r>
+          </a:p>
+          <a:p>
+            <a:endParaRPr lang="fr-FR"/>
+          </a:p>
+          <a:p>
+            <a:r>
+              <a:rPr lang="fr-FR" smtClean="0"/>
+              <a:t>Le </a:t>
+            </a:r>
+            <a:r>
+              <a:rPr lang="fr-FR"/>
+              <a:t>projet pourra </a:t>
+            </a:r>
+            <a:r>
+              <a:rPr lang="fr-FR"/>
+              <a:t>se </a:t>
+            </a:r>
+            <a:r>
+              <a:rPr lang="fr-FR" smtClean="0"/>
+              <a:t>poursuivre l’année </a:t>
+            </a:r>
+            <a:r>
+              <a:rPr lang="fr-FR"/>
+              <a:t>prochaine :</a:t>
+            </a:r>
+          </a:p>
+          <a:p>
+            <a:r>
+              <a:rPr lang="fr-FR" smtClean="0"/>
+              <a:t>	Documentation </a:t>
+            </a:r>
+            <a:r>
+              <a:rPr lang="fr-FR"/>
+              <a:t>technique</a:t>
+            </a:r>
+          </a:p>
+          <a:p>
+            <a:r>
+              <a:rPr lang="fr-FR" smtClean="0"/>
+              <a:t>	Tests </a:t>
+            </a:r>
+            <a:r>
+              <a:rPr lang="fr-FR"/>
+              <a:t>unitaires</a:t>
             </a:r>
           </a:p>
         </p:txBody>

</xml_diff>

<commit_message>
ajout logo dans soutenance planif
</commit_message>
<xml_diff>
--- a/soutenances/planification/soutenance_planification.pptx
+++ b/soutenances/planification/soutenance_planification.pptx
@@ -11,7 +11,7 @@
   <p:sldIdLst>
     <p:sldId id="256" r:id="rId3"/>
     <p:sldId id="257" r:id="rId4"/>
-    <p:sldId id="258" r:id="rId5"/>
+    <p:sldId id="279" r:id="rId5"/>
     <p:sldId id="259" r:id="rId6"/>
     <p:sldId id="260" r:id="rId7"/>
     <p:sldId id="261" r:id="rId8"/>
@@ -440,81 +440,75 @@
       </p:grpSpPr>
       <p:sp>
         <p:nvSpPr>
-          <p:cNvPr id="156" name="PlaceHolder 1"/>
+          <p:cNvPr id="2" name="Espace réservé de l'image des diapositives 1"/>
+          <p:cNvSpPr>
+            <a:spLocks noGrp="1" noRot="1" noChangeAspect="1"/>
+          </p:cNvSpPr>
+          <p:nvPr>
+            <p:ph type="sldImg"/>
+          </p:nvPr>
+        </p:nvSpPr>
+        <p:spPr>
+          <a:xfrm>
+            <a:off x="1143000" y="685800"/>
+            <a:ext cx="4572000" cy="3429000"/>
+          </a:xfrm>
+          <a:prstGeom prst="rect">
+            <a:avLst/>
+          </a:prstGeom>
+          <a:noFill/>
+          <a:ln w="12700">
+            <a:solidFill>
+              <a:prstClr val="black"/>
+            </a:solidFill>
+          </a:ln>
+        </p:spPr>
+      </p:sp>
+      <p:sp>
+        <p:nvSpPr>
+          <p:cNvPr id="3" name="Espace réservé des commentaires 2"/>
           <p:cNvSpPr>
             <a:spLocks noGrp="1"/>
           </p:cNvSpPr>
           <p:nvPr>
-            <p:ph type="body"/>
+            <p:ph type="body" idx="1"/>
           </p:nvPr>
         </p:nvSpPr>
-        <p:spPr>
-          <a:xfrm>
-            <a:off x="685800" y="4343400"/>
-            <a:ext cx="5486040" cy="4114440"/>
-          </a:xfrm>
-          <a:prstGeom prst="rect">
-            <a:avLst/>
-          </a:prstGeom>
-        </p:spPr>
+        <p:spPr/>
+        <p:txBody>
+          <a:bodyPr>
+            <a:normAutofit/>
+          </a:bodyPr>
+          <a:lstStyle/>
+          <a:p>
+            <a:endParaRPr lang="fr-FR"/>
+          </a:p>
+        </p:txBody>
+      </p:sp>
+      <p:sp>
+        <p:nvSpPr>
+          <p:cNvPr id="4" name="Espace réservé du numéro de diapositive 3"/>
+          <p:cNvSpPr>
+            <a:spLocks noGrp="1"/>
+          </p:cNvSpPr>
+          <p:nvPr>
+            <p:ph type="sldNum" idx="10"/>
+          </p:nvPr>
+        </p:nvSpPr>
+        <p:spPr/>
         <p:txBody>
           <a:bodyPr/>
           <a:lstStyle/>
           <a:p>
-            <a:r>
-              <a:rPr lang="fr-FR" sz="2000" strike="noStrike">
-                <a:latin typeface="Arial"/>
-              </a:rPr>
-              <a:t>Formalisme que nous ne développerons pas</a:t>
-            </a:r>
-            <a:endParaRPr/>
-          </a:p>
-        </p:txBody>
-      </p:sp>
-      <p:sp>
-        <p:nvSpPr>
-          <p:cNvPr id="157" name="TextShape 2"/>
-          <p:cNvSpPr txBox="1"/>
-          <p:nvPr/>
-        </p:nvSpPr>
-        <p:spPr>
-          <a:xfrm>
-            <a:off x="3884760" y="8685360"/>
-            <a:ext cx="2971440" cy="456840"/>
-          </a:xfrm>
-          <a:prstGeom prst="rect">
-            <a:avLst/>
-          </a:prstGeom>
-          <a:noFill/>
-          <a:ln>
-            <a:noFill/>
-          </a:ln>
-        </p:spPr>
-        <p:txBody>
-          <a:bodyPr anchor="b"/>
-          <a:lstStyle/>
-          <a:p>
-            <a:pPr algn="r">
-              <a:lnSpc>
-                <a:spcPct val="100000"/>
-              </a:lnSpc>
-            </a:pPr>
-            <a:fld id="{E0BDB075-CA7F-4AE9-8CC0-06B8D878903B}" type="slidenum">
-              <a:rPr lang="fr-FR" sz="1200" strike="noStrike">
-                <a:solidFill>
-                  <a:srgbClr val="000000"/>
-                </a:solidFill>
-                <a:latin typeface="+mn-lt"/>
-                <a:ea typeface="+mn-ea"/>
-              </a:rPr>
-              <a:pPr algn="r">
-                <a:lnSpc>
-                  <a:spcPct val="100000"/>
-                </a:lnSpc>
-              </a:pPr>
-              <a:t>5</a:t>
+            <a:pPr algn="r"/>
+            <a:fld id="{DAE4472E-6CE6-45D8-A535-0399A0614DAA}" type="slidenum">
+              <a:rPr lang="fr-FR" sz="1400" smtClean="0">
+                <a:latin typeface="Times New Roman"/>
+              </a:rPr>
+              <a:pPr algn="r"/>
+              <a:t>1</a:t>
             </a:fld>
-            <a:endParaRPr/>
+            <a:endParaRPr lang="fr-FR"/>
           </a:p>
         </p:txBody>
       </p:sp>
@@ -527,6 +521,111 @@
 </file>
 
 <file path=ppt/notesSlides/notesSlide2.xml><?xml version="1.0" encoding="utf-8"?>
+<p:notes xmlns:a="http://schemas.openxmlformats.org/drawingml/2006/main" xmlns:r="http://schemas.openxmlformats.org/officeDocument/2006/relationships" xmlns:p="http://schemas.openxmlformats.org/presentationml/2006/main">
+  <p:cSld>
+    <p:spTree>
+      <p:nvGrpSpPr>
+        <p:cNvPr id="1" name=""/>
+        <p:cNvGrpSpPr/>
+        <p:nvPr/>
+      </p:nvGrpSpPr>
+      <p:grpSpPr>
+        <a:xfrm>
+          <a:off x="0" y="0"/>
+          <a:ext cx="0" cy="0"/>
+          <a:chOff x="0" y="0"/>
+          <a:chExt cx="0" cy="0"/>
+        </a:xfrm>
+      </p:grpSpPr>
+      <p:sp>
+        <p:nvSpPr>
+          <p:cNvPr id="156" name="PlaceHolder 1"/>
+          <p:cNvSpPr>
+            <a:spLocks noGrp="1"/>
+          </p:cNvSpPr>
+          <p:nvPr>
+            <p:ph type="body"/>
+          </p:nvPr>
+        </p:nvSpPr>
+        <p:spPr>
+          <a:xfrm>
+            <a:off x="685800" y="4343400"/>
+            <a:ext cx="5486040" cy="4114440"/>
+          </a:xfrm>
+          <a:prstGeom prst="rect">
+            <a:avLst/>
+          </a:prstGeom>
+        </p:spPr>
+        <p:txBody>
+          <a:bodyPr/>
+          <a:lstStyle/>
+          <a:p>
+            <a:r>
+              <a:rPr lang="fr-FR" sz="2000" strike="noStrike">
+                <a:latin typeface="Arial"/>
+              </a:rPr>
+              <a:t>Formalisme que nous ne développerons pas</a:t>
+            </a:r>
+            <a:endParaRPr/>
+          </a:p>
+        </p:txBody>
+      </p:sp>
+      <p:sp>
+        <p:nvSpPr>
+          <p:cNvPr id="157" name="TextShape 2"/>
+          <p:cNvSpPr txBox="1"/>
+          <p:nvPr/>
+        </p:nvSpPr>
+        <p:spPr>
+          <a:xfrm>
+            <a:off x="3884760" y="8685360"/>
+            <a:ext cx="2971440" cy="456840"/>
+          </a:xfrm>
+          <a:prstGeom prst="rect">
+            <a:avLst/>
+          </a:prstGeom>
+          <a:noFill/>
+          <a:ln>
+            <a:noFill/>
+          </a:ln>
+        </p:spPr>
+        <p:txBody>
+          <a:bodyPr anchor="b"/>
+          <a:lstStyle/>
+          <a:p>
+            <a:pPr algn="r">
+              <a:lnSpc>
+                <a:spcPct val="100000"/>
+              </a:lnSpc>
+            </a:pPr>
+            <a:fld id="{E0BDB075-CA7F-4AE9-8CC0-06B8D878903B}" type="slidenum">
+              <a:rPr lang="fr-FR" sz="1200" strike="noStrike">
+                <a:solidFill>
+                  <a:srgbClr val="000000"/>
+                </a:solidFill>
+                <a:latin typeface="+mn-lt"/>
+                <a:ea typeface="+mn-ea"/>
+              </a:rPr>
+              <a:pPr algn="r">
+                <a:lnSpc>
+                  <a:spcPct val="100000"/>
+                </a:lnSpc>
+              </a:pPr>
+              <a:t>5</a:t>
+            </a:fld>
+            <a:endParaRPr/>
+          </a:p>
+        </p:txBody>
+      </p:sp>
+    </p:spTree>
+  </p:cSld>
+  <p:clrMapOvr>
+    <a:masterClrMapping/>
+  </p:clrMapOvr>
+</p:notes>
+</file>
+
+<file path=ppt/notesSlides/notesSlide3.xml><?xml version="1.0" encoding="utf-8"?>
 <p:notes xmlns:a="http://schemas.openxmlformats.org/drawingml/2006/main" xmlns:r="http://schemas.openxmlformats.org/officeDocument/2006/relationships" xmlns:p="http://schemas.openxmlformats.org/presentationml/2006/main">
   <p:cSld>
     <p:spTree>
@@ -4989,7 +5088,7 @@
               </a:lnSpc>
             </a:pPr>
             <a:r>
-              <a:rPr lang="fr-FR" sz="2000" strike="noStrike">
+              <a:rPr lang="fr-FR" sz="2000" strike="noStrike" cap="small">
                 <a:solidFill>
                   <a:srgbClr val="2F2F2F"/>
                 </a:solidFill>
@@ -4997,7 +5096,7 @@
               </a:rPr>
               <a:t>Soutenance de planification</a:t>
             </a:r>
-            <a:endParaRPr/>
+            <a:endParaRPr cap="small"/>
           </a:p>
         </p:txBody>
       </p:sp>
@@ -5044,13 +5143,17 @@
             <a:r>
               <a:rPr lang="fr-FR" b="1" strike="noStrike">
                 <a:solidFill>
-                  <a:srgbClr val="E52713"/>
+                  <a:schemeClr val="bg1"/>
                 </a:solidFill>
                 <a:latin typeface="Arial"/>
               </a:rPr>
               <a:t>Encadrants</a:t>
             </a:r>
-            <a:endParaRPr/>
+            <a:endParaRPr>
+              <a:solidFill>
+                <a:schemeClr val="bg1"/>
+              </a:solidFill>
+            </a:endParaRPr>
           </a:p>
         </p:txBody>
       </p:sp>
@@ -5096,9 +5199,6 @@
             </a:pPr>
             <a:r>
               <a:rPr lang="fr-FR" strike="noStrike">
-                <a:solidFill>
-                  <a:srgbClr val="2F2F2F"/>
-                </a:solidFill>
                 <a:latin typeface="Arial"/>
               </a:rPr>
               <a:t>Gildas AVOINE</a:t>
@@ -5113,9 +5213,6 @@
             </a:pPr>
             <a:r>
               <a:rPr lang="fr-FR" strike="noStrike">
-                <a:solidFill>
-                  <a:srgbClr val="2F2F2F"/>
-                </a:solidFill>
                 <a:latin typeface="Arial"/>
               </a:rPr>
               <a:t>Barbara KORDY</a:t>
@@ -5323,8 +5420,8 @@
         </p:nvSpPr>
         <p:spPr>
           <a:xfrm>
-            <a:off x="0" y="2061000"/>
-            <a:ext cx="4715640" cy="1613880"/>
+            <a:off x="0" y="1628800"/>
+            <a:ext cx="4715640" cy="2880320"/>
           </a:xfrm>
           <a:prstGeom prst="rect">
             <a:avLst/>
@@ -5356,15 +5453,11 @@
               </a:lnSpc>
             </a:pPr>
             <a:r>
-              <a:rPr lang="fr-FR" sz="2500" strike="noStrike">
-                <a:solidFill>
-                  <a:srgbClr val="2F2F2F"/>
-                </a:solidFill>
-                <a:latin typeface="Arial"/>
-              </a:rPr>
-              <a:t>Est-il difficile </a:t>
-            </a:r>
-            <a:endParaRPr/>
+              <a:rPr lang="fr-FR" sz="2800" b="1" strike="noStrike" cap="small" smtClean="0">
+                <a:latin typeface="+mj-lt"/>
+              </a:rPr>
+              <a:t>Est-il</a:t>
+            </a:r>
           </a:p>
           <a:p>
             <a:pPr>
@@ -5373,15 +5466,11 @@
               </a:lnSpc>
             </a:pPr>
             <a:r>
-              <a:rPr lang="fr-FR" sz="2500" strike="noStrike">
-                <a:solidFill>
-                  <a:srgbClr val="2F2F2F"/>
-                </a:solidFill>
-                <a:latin typeface="Arial"/>
-              </a:rPr>
-              <a:t>de paralyser les</a:t>
-            </a:r>
-            <a:endParaRPr/>
+              <a:rPr lang="fr-FR" sz="2800" b="1" strike="noStrike" cap="small" smtClean="0">
+                <a:latin typeface="+mj-lt"/>
+              </a:rPr>
+              <a:t>difficile de</a:t>
+            </a:r>
           </a:p>
           <a:p>
             <a:pPr>
@@ -5390,15 +5479,20 @@
               </a:lnSpc>
             </a:pPr>
             <a:r>
-              <a:rPr lang="fr-FR" sz="2500" strike="noStrike">
-                <a:solidFill>
-                  <a:srgbClr val="2F2F2F"/>
-                </a:solidFill>
-                <a:latin typeface="Arial"/>
-              </a:rPr>
-              <a:t>transports en commun </a:t>
-            </a:r>
-            <a:endParaRPr/>
+              <a:rPr lang="fr-FR" sz="2800" b="1" strike="noStrike" cap="small" smtClean="0">
+                <a:latin typeface="+mj-lt"/>
+              </a:rPr>
+              <a:t>paralyser </a:t>
+            </a:r>
+            <a:r>
+              <a:rPr lang="fr-FR" sz="2800" b="1" strike="noStrike" cap="small">
+                <a:latin typeface="+mj-lt"/>
+              </a:rPr>
+              <a:t>les</a:t>
+            </a:r>
+            <a:endParaRPr sz="2800" b="1" cap="small">
+              <a:latin typeface="+mj-lt"/>
+            </a:endParaRPr>
           </a:p>
           <a:p>
             <a:pPr>
@@ -5407,15 +5501,49 @@
               </a:lnSpc>
             </a:pPr>
             <a:r>
-              <a:rPr lang="fr-FR" sz="2500" strike="noStrike">
-                <a:solidFill>
-                  <a:srgbClr val="2F2F2F"/>
-                </a:solidFill>
-                <a:latin typeface="Arial"/>
-              </a:rPr>
-              <a:t>à Rennes ?</a:t>
-            </a:r>
-            <a:endParaRPr/>
+              <a:rPr lang="fr-FR" sz="2800" b="1" strike="noStrike" cap="small">
+                <a:latin typeface="+mj-lt"/>
+              </a:rPr>
+              <a:t>transports en </a:t>
+            </a:r>
+            <a:endParaRPr lang="fr-FR" sz="2800" b="1" strike="noStrike" cap="small" smtClean="0">
+              <a:latin typeface="+mj-lt"/>
+            </a:endParaRPr>
+          </a:p>
+          <a:p>
+            <a:pPr>
+              <a:lnSpc>
+                <a:spcPct val="100000"/>
+              </a:lnSpc>
+            </a:pPr>
+            <a:r>
+              <a:rPr lang="fr-FR" sz="2800" b="1" strike="noStrike" cap="small" smtClean="0">
+                <a:latin typeface="+mj-lt"/>
+              </a:rPr>
+              <a:t>commun de</a:t>
+            </a:r>
+          </a:p>
+          <a:p>
+            <a:pPr>
+              <a:lnSpc>
+                <a:spcPct val="100000"/>
+              </a:lnSpc>
+            </a:pPr>
+            <a:r>
+              <a:rPr lang="fr-FR" sz="2800" b="1" strike="noStrike" cap="small" smtClean="0">
+                <a:latin typeface="+mj-lt"/>
+              </a:rPr>
+              <a:t>Rennes </a:t>
+            </a:r>
+            <a:r>
+              <a:rPr lang="fr-FR" sz="2800" b="1" strike="noStrike" cap="small">
+                <a:latin typeface="+mj-lt"/>
+              </a:rPr>
+              <a:t>?</a:t>
+            </a:r>
+            <a:endParaRPr sz="2800" b="1" cap="small">
+              <a:latin typeface="+mj-lt"/>
+            </a:endParaRPr>
           </a:p>
         </p:txBody>
       </p:sp>
@@ -5559,25 +5687,32 @@
             </a:pPr>
             <a:endParaRPr/>
           </a:p>
-          <a:p>
-            <a:pPr>
-              <a:lnSpc>
-                <a:spcPct val="100000"/>
-              </a:lnSpc>
-            </a:pPr>
-            <a:r>
-              <a:rPr lang="fr-FR" sz="2000" b="1" strike="noStrike">
-                <a:solidFill>
-                  <a:srgbClr val="004D6F"/>
-                </a:solidFill>
-                <a:latin typeface="Arial"/>
-              </a:rPr>
-              <a:t>ADTool</a:t>
-            </a:r>
-            <a:endParaRPr/>
-          </a:p>
-        </p:txBody>
-      </p:sp>
+        </p:txBody>
+      </p:sp>
+      <p:pic>
+        <p:nvPicPr>
+          <p:cNvPr id="4" name="Image 3" descr="ADTool.png"/>
+          <p:cNvPicPr>
+            <a:picLocks noChangeAspect="1"/>
+          </p:cNvPicPr>
+          <p:nvPr/>
+        </p:nvPicPr>
+        <p:blipFill>
+          <a:blip r:embed="rId2" cstate="print"/>
+          <a:stretch>
+            <a:fillRect/>
+          </a:stretch>
+        </p:blipFill>
+        <p:spPr>
+          <a:xfrm>
+            <a:off x="2555776" y="2276872"/>
+            <a:ext cx="4401681" cy="2507935"/>
+          </a:xfrm>
+          <a:prstGeom prst="rect">
+            <a:avLst/>
+          </a:prstGeom>
+        </p:spPr>
+      </p:pic>
     </p:spTree>
   </p:cSld>
   <p:clrMapOvr>
@@ -5691,25 +5826,32 @@
             </a:pPr>
             <a:endParaRPr/>
           </a:p>
-          <a:p>
-            <a:pPr>
-              <a:lnSpc>
-                <a:spcPct val="100000"/>
-              </a:lnSpc>
-            </a:pPr>
-            <a:r>
-              <a:rPr lang="fr-FR" sz="2000" b="1" strike="noStrike">
-                <a:solidFill>
-                  <a:srgbClr val="004D6F"/>
-                </a:solidFill>
-                <a:latin typeface="Arial"/>
-              </a:rPr>
-              <a:t>Windows</a:t>
-            </a:r>
-            <a:endParaRPr/>
-          </a:p>
-        </p:txBody>
-      </p:sp>
+        </p:txBody>
+      </p:sp>
+      <p:pic>
+        <p:nvPicPr>
+          <p:cNvPr id="4" name="Image 3" descr="Windows_logo.png"/>
+          <p:cNvPicPr>
+            <a:picLocks noChangeAspect="1"/>
+          </p:cNvPicPr>
+          <p:nvPr/>
+        </p:nvPicPr>
+        <p:blipFill>
+          <a:blip r:embed="rId2" cstate="print"/>
+          <a:stretch>
+            <a:fillRect/>
+          </a:stretch>
+        </p:blipFill>
+        <p:spPr>
+          <a:xfrm>
+            <a:off x="3275856" y="2348880"/>
+            <a:ext cx="2559536" cy="2559536"/>
+          </a:xfrm>
+          <a:prstGeom prst="rect">
+            <a:avLst/>
+          </a:prstGeom>
+        </p:spPr>
+      </p:pic>
     </p:spTree>
   </p:cSld>
   <p:clrMapOvr>
@@ -5891,13 +6033,47 @@
               </a:lnSpc>
             </a:pPr>
             <a:r>
+              <a:rPr lang="fr-FR" sz="2000" b="1" strike="noStrike">
+                <a:solidFill>
+                  <a:srgbClr val="004D6F"/>
+                </a:solidFill>
+                <a:latin typeface="Arial"/>
+              </a:rPr>
+              <a:t>Livraison </a:t>
+            </a:r>
+            <a:r>
+              <a:rPr lang="fr-FR" sz="2000" b="1" strike="noStrike" smtClean="0">
+                <a:solidFill>
+                  <a:srgbClr val="004D6F"/>
+                </a:solidFill>
+                <a:latin typeface="Arial"/>
+              </a:rPr>
+              <a:t>:</a:t>
+            </a:r>
+            <a:endParaRPr dirty="0"/>
+          </a:p>
+          <a:p>
+            <a:pPr>
+              <a:lnSpc>
+                <a:spcPct val="100000"/>
+              </a:lnSpc>
+            </a:pPr>
+            <a:endParaRPr dirty="0"/>
+          </a:p>
+          <a:p>
+            <a:pPr>
+              <a:lnSpc>
+                <a:spcPct val="100000"/>
+              </a:lnSpc>
+            </a:pPr>
+            <a:r>
               <a:rPr lang="fr-FR" sz="2000" b="1" strike="noStrike" dirty="0">
                 <a:solidFill>
                   <a:srgbClr val="004D6F"/>
                 </a:solidFill>
                 <a:latin typeface="Arial"/>
               </a:rPr>
-              <a:t>Livraison : 28 mai</a:t>
+              <a:t>Semaines bloquées</a:t>
             </a:r>
             <a:endParaRPr dirty="0"/>
           </a:p>
@@ -5907,6 +6083,14 @@
                 <a:spcPct val="100000"/>
               </a:lnSpc>
             </a:pPr>
+            <a:endParaRPr lang="fr-FR" smtClean="0"/>
+          </a:p>
+          <a:p>
+            <a:pPr>
+              <a:lnSpc>
+                <a:spcPct val="100000"/>
+              </a:lnSpc>
+            </a:pPr>
             <a:endParaRPr dirty="0"/>
           </a:p>
           <a:p>
@@ -5916,89 +6100,13 @@
               </a:lnSpc>
             </a:pPr>
             <a:r>
-              <a:rPr lang="fr-FR" sz="2000" b="1" strike="noStrike" dirty="0">
+              <a:rPr lang="fr-FR" sz="2000" b="1" strike="noStrike" smtClean="0">
                 <a:solidFill>
                   <a:srgbClr val="004D6F"/>
                 </a:solidFill>
                 <a:latin typeface="Arial"/>
               </a:rPr>
-              <a:t>Semaines bloquées</a:t>
-            </a:r>
-            <a:endParaRPr dirty="0"/>
-          </a:p>
-          <a:p>
-            <a:pPr>
-              <a:lnSpc>
-                <a:spcPct val="100000"/>
-              </a:lnSpc>
-            </a:pPr>
-            <a:r>
-              <a:rPr lang="fr-FR" sz="2000" b="1" strike="noStrike" dirty="0">
-                <a:solidFill>
-                  <a:srgbClr val="004D6F"/>
-                </a:solidFill>
-                <a:latin typeface="Arial"/>
-              </a:rPr>
-              <a:t>16/12 ; 20/05 ; 26/05</a:t>
-            </a:r>
-            <a:endParaRPr dirty="0"/>
-          </a:p>
-          <a:p>
-            <a:pPr>
-              <a:lnSpc>
-                <a:spcPct val="100000"/>
-              </a:lnSpc>
-            </a:pPr>
-            <a:endParaRPr dirty="0"/>
-          </a:p>
-          <a:p>
-            <a:pPr>
-              <a:lnSpc>
-                <a:spcPct val="100000"/>
-              </a:lnSpc>
-            </a:pPr>
-            <a:r>
-              <a:rPr lang="fr-FR" sz="2000" b="1" strike="noStrike" dirty="0">
-                <a:solidFill>
-                  <a:srgbClr val="004D6F"/>
-                </a:solidFill>
-                <a:latin typeface="Arial"/>
-              </a:rPr>
               <a:t>Vacances</a:t>
-            </a:r>
-            <a:endParaRPr dirty="0"/>
-          </a:p>
-          <a:p>
-            <a:pPr>
-              <a:lnSpc>
-                <a:spcPct val="100000"/>
-              </a:lnSpc>
-            </a:pPr>
-            <a:r>
-              <a:rPr lang="fr-FR" sz="2000" b="1" strike="noStrike" dirty="0">
-                <a:solidFill>
-                  <a:srgbClr val="004D6F"/>
-                </a:solidFill>
-                <a:latin typeface="Arial"/>
-              </a:rPr>
-              <a:t>du 22/12/2013 au 17/01/2014</a:t>
-            </a:r>
-            <a:endParaRPr dirty="0"/>
-          </a:p>
-          <a:p>
-            <a:pPr>
-              <a:lnSpc>
-                <a:spcPct val="100000"/>
-              </a:lnSpc>
-            </a:pPr>
-            <a:r>
-              <a:rPr lang="fr-FR" sz="2000" b="1" strike="noStrike" dirty="0">
-                <a:solidFill>
-                  <a:srgbClr val="004D6F"/>
-                </a:solidFill>
-                <a:latin typeface="Arial"/>
-              </a:rPr>
-              <a:t>du 27/04/2014 au 16/05/2014.</a:t>
             </a:r>
             <a:endParaRPr dirty="0"/>
           </a:p>
@@ -7948,95 +8056,30 @@
           </a:p>
         </p:txBody>
       </p:sp>
-      <p:sp>
-        <p:nvSpPr>
-          <p:cNvPr id="155" name="TextShape 2"/>
-          <p:cNvSpPr txBox="1"/>
+      <p:pic>
+        <p:nvPicPr>
+          <p:cNvPr id="5" name="Image 4" descr="thanks.jpg"/>
+          <p:cNvPicPr>
+            <a:picLocks noChangeAspect="1"/>
+          </p:cNvPicPr>
           <p:nvPr/>
-        </p:nvSpPr>
-        <p:spPr>
-          <a:xfrm>
-            <a:off x="457200" y="980640"/>
-            <a:ext cx="8229240" cy="5328360"/>
-          </a:xfrm>
-          <a:prstGeom prst="rect">
-            <a:avLst/>
-          </a:prstGeom>
-          <a:noFill/>
-          <a:ln>
-            <a:noFill/>
-          </a:ln>
-        </p:spPr>
-        <p:txBody>
-          <a:bodyPr/>
-          <a:lstStyle/>
-          <a:p>
-            <a:pPr algn="ctr">
-              <a:lnSpc>
-                <a:spcPct val="100000"/>
-              </a:lnSpc>
-            </a:pPr>
-            <a:endParaRPr/>
-          </a:p>
-          <a:p>
-            <a:pPr algn="ctr">
-              <a:lnSpc>
-                <a:spcPct val="100000"/>
-              </a:lnSpc>
-            </a:pPr>
-            <a:endParaRPr/>
-          </a:p>
-          <a:p>
-            <a:pPr algn="ctr">
-              <a:lnSpc>
-                <a:spcPct val="100000"/>
-              </a:lnSpc>
-            </a:pPr>
-            <a:r>
-              <a:rPr lang="fr-FR" sz="2800" b="1" strike="noStrike">
-                <a:solidFill>
-                  <a:srgbClr val="004D6F"/>
-                </a:solidFill>
-                <a:latin typeface="Arial"/>
-              </a:rPr>
-              <a:t>Merci de ton attention enculé</a:t>
-            </a:r>
-            <a:endParaRPr/>
-          </a:p>
-          <a:p>
-            <a:pPr>
-              <a:lnSpc>
-                <a:spcPct val="100000"/>
-              </a:lnSpc>
-            </a:pPr>
-            <a:endParaRPr/>
-          </a:p>
-          <a:p>
-            <a:pPr>
-              <a:lnSpc>
-                <a:spcPct val="100000"/>
-              </a:lnSpc>
-            </a:pPr>
-            <a:endParaRPr/>
-          </a:p>
-          <a:p>
-            <a:pPr>
-              <a:lnSpc>
-                <a:spcPct val="100000"/>
-              </a:lnSpc>
-            </a:pPr>
-            <a:endParaRPr/>
-          </a:p>
-          <a:p>
-            <a:pPr>
-              <a:lnSpc>
-                <a:spcPct val="100000"/>
-              </a:lnSpc>
-            </a:pPr>
-            <a:endParaRPr/>
-          </a:p>
-        </p:txBody>
-      </p:sp>
+        </p:nvPicPr>
+        <p:blipFill>
+          <a:blip r:embed="rId2" cstate="print"/>
+          <a:stretch>
+            <a:fillRect/>
+          </a:stretch>
+        </p:blipFill>
+        <p:spPr>
+          <a:xfrm>
+            <a:off x="2644140" y="1478280"/>
+            <a:ext cx="3855720" cy="3901440"/>
+          </a:xfrm>
+          <a:prstGeom prst="rect">
+            <a:avLst/>
+          </a:prstGeom>
+        </p:spPr>
+      </p:pic>
     </p:spTree>
   </p:cSld>
   <p:clrMapOvr>
@@ -8064,7 +8107,7 @@
       </p:grpSpPr>
       <p:sp>
         <p:nvSpPr>
-          <p:cNvPr id="110" name="TextShape 1"/>
+          <p:cNvPr id="122" name="TextShape 1"/>
           <p:cNvSpPr txBox="1"/>
           <p:nvPr/>
         </p:nvSpPr>
@@ -8091,13 +8134,13 @@
       </p:sp>
       <p:sp>
         <p:nvSpPr>
-          <p:cNvPr id="111" name="TextShape 2"/>
+          <p:cNvPr id="123" name="TextShape 2"/>
           <p:cNvSpPr txBox="1"/>
           <p:nvPr/>
         </p:nvSpPr>
         <p:spPr>
           <a:xfrm>
-            <a:off x="482760" y="1800000"/>
+            <a:off x="457200" y="2781000"/>
             <a:ext cx="8229240" cy="3528000"/>
           </a:xfrm>
           <a:prstGeom prst="rect">
@@ -8118,73 +8161,23 @@
               </a:lnSpc>
             </a:pPr>
             <a:r>
-              <a:rPr lang="fr-FR" sz="5400" b="1" strike="noStrike">
+              <a:rPr lang="fr-FR" sz="5400" b="1" strike="noStrike" smtClean="0">
                 <a:solidFill>
                   <a:srgbClr val="004D6F"/>
                 </a:solidFill>
                 <a:latin typeface="Arial"/>
               </a:rPr>
-              <a:t>Besoins</a:t>
-            </a:r>
-            <a:endParaRPr/>
-          </a:p>
-        </p:txBody>
-      </p:sp>
-      <p:pic>
-        <p:nvPicPr>
-          <p:cNvPr id="112" name="Image 111"/>
-          <p:cNvPicPr/>
-          <p:nvPr/>
-        </p:nvPicPr>
-        <p:blipFill>
-          <a:blip r:embed="rId2" cstate="print"/>
-          <a:stretch/>
-        </p:blipFill>
-        <p:spPr>
-          <a:xfrm>
-            <a:off x="3341160" y="3197160"/>
-            <a:ext cx="2418840" cy="2418840"/>
-          </a:xfrm>
-          <a:prstGeom prst="rect">
-            <a:avLst/>
-          </a:prstGeom>
-          <a:ln>
-            <a:noFill/>
-          </a:ln>
-        </p:spPr>
-      </p:pic>
+              <a:t>Besoin</a:t>
+            </a:r>
+            <a:endParaRPr/>
+          </a:p>
+        </p:txBody>
+      </p:sp>
     </p:spTree>
   </p:cSld>
   <p:clrMapOvr>
     <a:masterClrMapping/>
   </p:clrMapOvr>
-  <p:timing>
-    <p:tnLst>
-      <p:par>
-        <p:cTn id="1" dur="indefinite" restart="never" nodeType="tmRoot">
-          <p:childTnLst>
-            <p:seq>
-              <p:cTn id="2" nodeType="mainSeq"/>
-              <p:prevCondLst>
-                <p:cond evt="onPrev" delay="0">
-                  <p:tgtEl>
-                    <p:sldTgt/>
-                  </p:tgtEl>
-                </p:cond>
-              </p:prevCondLst>
-              <p:nextCondLst>
-                <p:cond evt="onNext" delay="0">
-                  <p:tgtEl>
-                    <p:sldTgt/>
-                  </p:tgtEl>
-                </p:cond>
-              </p:nextCondLst>
-            </p:seq>
-          </p:childTnLst>
-        </p:cTn>
-      </p:par>
-    </p:tnLst>
-  </p:timing>
 </p:sld>
 </file>
 
@@ -9366,42 +9359,42 @@
 <file path=ppt/theme/theme2.xml><?xml version="1.0" encoding="utf-8"?>
 <a:theme xmlns:a="http://schemas.openxmlformats.org/drawingml/2006/main" name="Office Theme">
   <a:themeElements>
-    <a:clrScheme name="Office">
+    <a:clrScheme name="Personnalisé 1">
       <a:dk1>
         <a:sysClr val="windowText" lastClr="000000"/>
       </a:dk1>
       <a:lt1>
-        <a:sysClr val="window" lastClr="FFFFFF"/>
+        <a:srgbClr val="FFFFFF"/>
       </a:lt1>
       <a:dk2>
-        <a:srgbClr val="1F497D"/>
+        <a:srgbClr val="69676D"/>
       </a:dk2>
       <a:lt2>
-        <a:srgbClr val="EEECE1"/>
+        <a:srgbClr val="C9C2D1"/>
       </a:lt2>
       <a:accent1>
-        <a:srgbClr val="4F81BD"/>
+        <a:srgbClr val="C1CEEB"/>
       </a:accent1>
       <a:accent2>
-        <a:srgbClr val="C0504D"/>
+        <a:srgbClr val="9CB084"/>
       </a:accent2>
       <a:accent3>
-        <a:srgbClr val="9BBB59"/>
+        <a:srgbClr val="6BB1C9"/>
       </a:accent3>
       <a:accent4>
-        <a:srgbClr val="8064A2"/>
+        <a:srgbClr val="6585CF"/>
       </a:accent4>
       <a:accent5>
-        <a:srgbClr val="4BACC6"/>
+        <a:srgbClr val="7E6BC9"/>
       </a:accent5>
       <a:accent6>
-        <a:srgbClr val="F79646"/>
+        <a:srgbClr val="A379BB"/>
       </a:accent6>
       <a:hlink>
-        <a:srgbClr val="0000FF"/>
+        <a:srgbClr val="410082"/>
       </a:hlink>
       <a:folHlink>
-        <a:srgbClr val="800080"/>
+        <a:srgbClr val="932968"/>
       </a:folHlink>
     </a:clrScheme>
     <a:fontScheme name="Office">

</xml_diff>